<commit_message>
Add LDPC on a rayleigh channel in ppt
</commit_message>
<xml_diff>
--- a/Final_project_reliable_multicast_retransmission_scheme.pptx
+++ b/Final_project_reliable_multicast_retransmission_scheme.pptx
@@ -884,7 +884,7 @@
           <a:p>
             <a:fld id="{927D0EF0-F536-40E1-B4CC-7751C36C6AE2}" type="datetimeFigureOut">
               <a:rPr lang="zh-TW" altLang="en-US" smtClean="0"/>
-              <a:t>2021/1/10</a:t>
+              <a:t>2021/1/11</a:t>
             </a:fld>
             <a:endParaRPr lang="zh-TW" altLang="en-US"/>
           </a:p>
@@ -1135,7 +1135,7 @@
           <a:p>
             <a:fld id="{927D0EF0-F536-40E1-B4CC-7751C36C6AE2}" type="datetimeFigureOut">
               <a:rPr lang="zh-TW" altLang="en-US" smtClean="0"/>
-              <a:t>2021/1/10</a:t>
+              <a:t>2021/1/11</a:t>
             </a:fld>
             <a:endParaRPr lang="zh-TW" altLang="en-US"/>
           </a:p>
@@ -1449,7 +1449,7 @@
           <a:p>
             <a:fld id="{927D0EF0-F536-40E1-B4CC-7751C36C6AE2}" type="datetimeFigureOut">
               <a:rPr lang="zh-TW" altLang="en-US" smtClean="0"/>
-              <a:t>2021/1/10</a:t>
+              <a:t>2021/1/11</a:t>
             </a:fld>
             <a:endParaRPr lang="zh-TW" altLang="en-US"/>
           </a:p>
@@ -1782,7 +1782,7 @@
           <a:p>
             <a:fld id="{927D0EF0-F536-40E1-B4CC-7751C36C6AE2}" type="datetimeFigureOut">
               <a:rPr lang="zh-TW" altLang="en-US" smtClean="0"/>
-              <a:t>2021/1/10</a:t>
+              <a:t>2021/1/11</a:t>
             </a:fld>
             <a:endParaRPr lang="zh-TW" altLang="en-US"/>
           </a:p>
@@ -2096,7 +2096,7 @@
           <a:p>
             <a:fld id="{927D0EF0-F536-40E1-B4CC-7751C36C6AE2}" type="datetimeFigureOut">
               <a:rPr lang="zh-TW" altLang="en-US" smtClean="0"/>
-              <a:t>2021/1/10</a:t>
+              <a:t>2021/1/11</a:t>
             </a:fld>
             <a:endParaRPr lang="zh-TW" altLang="en-US"/>
           </a:p>
@@ -2489,7 +2489,7 @@
           <a:p>
             <a:fld id="{927D0EF0-F536-40E1-B4CC-7751C36C6AE2}" type="datetimeFigureOut">
               <a:rPr lang="zh-TW" altLang="en-US" smtClean="0"/>
-              <a:t>2021/1/10</a:t>
+              <a:t>2021/1/11</a:t>
             </a:fld>
             <a:endParaRPr lang="zh-TW" altLang="en-US"/>
           </a:p>
@@ -2659,7 +2659,7 @@
           <a:p>
             <a:fld id="{927D0EF0-F536-40E1-B4CC-7751C36C6AE2}" type="datetimeFigureOut">
               <a:rPr lang="zh-TW" altLang="en-US" smtClean="0"/>
-              <a:t>2021/1/10</a:t>
+              <a:t>2021/1/11</a:t>
             </a:fld>
             <a:endParaRPr lang="zh-TW" altLang="en-US"/>
           </a:p>
@@ -2839,7 +2839,7 @@
           <a:p>
             <a:fld id="{927D0EF0-F536-40E1-B4CC-7751C36C6AE2}" type="datetimeFigureOut">
               <a:rPr lang="zh-TW" altLang="en-US" smtClean="0"/>
-              <a:t>2021/1/10</a:t>
+              <a:t>2021/1/11</a:t>
             </a:fld>
             <a:endParaRPr lang="zh-TW" altLang="en-US"/>
           </a:p>
@@ -3009,7 +3009,7 @@
           <a:p>
             <a:fld id="{927D0EF0-F536-40E1-B4CC-7751C36C6AE2}" type="datetimeFigureOut">
               <a:rPr lang="zh-TW" altLang="en-US" smtClean="0"/>
-              <a:t>2021/1/10</a:t>
+              <a:t>2021/1/11</a:t>
             </a:fld>
             <a:endParaRPr lang="zh-TW" altLang="en-US"/>
           </a:p>
@@ -3256,7 +3256,7 @@
           <a:p>
             <a:fld id="{927D0EF0-F536-40E1-B4CC-7751C36C6AE2}" type="datetimeFigureOut">
               <a:rPr lang="zh-TW" altLang="en-US" smtClean="0"/>
-              <a:t>2021/1/10</a:t>
+              <a:t>2021/1/11</a:t>
             </a:fld>
             <a:endParaRPr lang="zh-TW" altLang="en-US"/>
           </a:p>
@@ -3488,7 +3488,7 @@
           <a:p>
             <a:fld id="{927D0EF0-F536-40E1-B4CC-7751C36C6AE2}" type="datetimeFigureOut">
               <a:rPr lang="zh-TW" altLang="en-US" smtClean="0"/>
-              <a:t>2021/1/10</a:t>
+              <a:t>2021/1/11</a:t>
             </a:fld>
             <a:endParaRPr lang="zh-TW" altLang="en-US"/>
           </a:p>
@@ -3862,7 +3862,7 @@
           <a:p>
             <a:fld id="{927D0EF0-F536-40E1-B4CC-7751C36C6AE2}" type="datetimeFigureOut">
               <a:rPr lang="zh-TW" altLang="en-US" smtClean="0"/>
-              <a:t>2021/1/10</a:t>
+              <a:t>2021/1/11</a:t>
             </a:fld>
             <a:endParaRPr lang="zh-TW" altLang="en-US"/>
           </a:p>
@@ -3985,7 +3985,7 @@
           <a:p>
             <a:fld id="{927D0EF0-F536-40E1-B4CC-7751C36C6AE2}" type="datetimeFigureOut">
               <a:rPr lang="zh-TW" altLang="en-US" smtClean="0"/>
-              <a:t>2021/1/10</a:t>
+              <a:t>2021/1/11</a:t>
             </a:fld>
             <a:endParaRPr lang="zh-TW" altLang="en-US"/>
           </a:p>
@@ -4080,7 +4080,7 @@
           <a:p>
             <a:fld id="{927D0EF0-F536-40E1-B4CC-7751C36C6AE2}" type="datetimeFigureOut">
               <a:rPr lang="zh-TW" altLang="en-US" smtClean="0"/>
-              <a:t>2021/1/10</a:t>
+              <a:t>2021/1/11</a:t>
             </a:fld>
             <a:endParaRPr lang="zh-TW" altLang="en-US"/>
           </a:p>
@@ -4335,7 +4335,7 @@
           <a:p>
             <a:fld id="{927D0EF0-F536-40E1-B4CC-7751C36C6AE2}" type="datetimeFigureOut">
               <a:rPr lang="zh-TW" altLang="en-US" smtClean="0"/>
-              <a:t>2021/1/10</a:t>
+              <a:t>2021/1/11</a:t>
             </a:fld>
             <a:endParaRPr lang="zh-TW" altLang="en-US"/>
           </a:p>
@@ -4640,7 +4640,7 @@
           <a:p>
             <a:fld id="{927D0EF0-F536-40E1-B4CC-7751C36C6AE2}" type="datetimeFigureOut">
               <a:rPr lang="zh-TW" altLang="en-US" smtClean="0"/>
-              <a:t>2021/1/10</a:t>
+              <a:t>2021/1/11</a:t>
             </a:fld>
             <a:endParaRPr lang="zh-TW" altLang="en-US"/>
           </a:p>
@@ -5342,7 +5342,7 @@
           <a:p>
             <a:fld id="{927D0EF0-F536-40E1-B4CC-7751C36C6AE2}" type="datetimeFigureOut">
               <a:rPr lang="zh-TW" altLang="en-US" smtClean="0"/>
-              <a:t>2021/1/10</a:t>
+              <a:t>2021/1/11</a:t>
             </a:fld>
             <a:endParaRPr lang="zh-TW" altLang="en-US"/>
           </a:p>
@@ -6014,31 +6014,321 @@
           </a:p>
         </p:txBody>
       </p:sp>
-      <p:sp>
-        <p:nvSpPr>
-          <p:cNvPr id="3" name="內容版面配置區 2">
-            <a:extLst>
-              <a:ext uri="{FF2B5EF4-FFF2-40B4-BE49-F238E27FC236}">
-                <a16:creationId xmlns:a16="http://schemas.microsoft.com/office/drawing/2014/main" id="{ECE538FE-E561-461E-99DC-51E1772CB83B}"/>
-              </a:ext>
-            </a:extLst>
-          </p:cNvPr>
-          <p:cNvSpPr>
-            <a:spLocks noGrp="1"/>
-          </p:cNvSpPr>
-          <p:nvPr>
-            <p:ph idx="1"/>
-          </p:nvPr>
-        </p:nvSpPr>
-        <p:spPr/>
-        <p:txBody>
-          <a:bodyPr/>
-          <a:lstStyle/>
-          <a:p>
-            <a:endParaRPr lang="zh-TW" altLang="en-US" dirty="0"/>
-          </a:p>
-        </p:txBody>
-      </p:sp>
+      <mc:AlternateContent xmlns:mc="http://schemas.openxmlformats.org/markup-compatibility/2006">
+        <mc:Choice xmlns:a14="http://schemas.microsoft.com/office/drawing/2010/main" Requires="a14">
+          <p:sp>
+            <p:nvSpPr>
+              <p:cNvPr id="3" name="內容版面配置區 2">
+                <a:extLst>
+                  <a:ext uri="{FF2B5EF4-FFF2-40B4-BE49-F238E27FC236}">
+                    <a16:creationId xmlns:a16="http://schemas.microsoft.com/office/drawing/2014/main" id="{ECE538FE-E561-461E-99DC-51E1772CB83B}"/>
+                  </a:ext>
+                </a:extLst>
+              </p:cNvPr>
+              <p:cNvSpPr>
+                <a:spLocks noGrp="1"/>
+              </p:cNvSpPr>
+              <p:nvPr>
+                <p:ph idx="1"/>
+              </p:nvPr>
+            </p:nvSpPr>
+            <p:spPr/>
+            <p:txBody>
+              <a:bodyPr/>
+              <a:lstStyle/>
+              <a:p>
+                <a:r>
+                  <a:rPr lang="en-US" altLang="zh-TW" dirty="0" smtClean="0"/>
+                  <a:t>We use LDPC code with </a:t>
+                </a:r>
+                <a:r>
+                  <a:rPr lang="en-US" altLang="zh-TW" dirty="0" err="1" smtClean="0"/>
+                  <a:t>codeword</a:t>
+                </a:r>
+                <a:r>
+                  <a:rPr lang="en-US" altLang="zh-TW" dirty="0" smtClean="0"/>
+                  <a:t> length </a:t>
+                </a:r>
+                <a14:m>
+                  <m:oMath xmlns:m="http://schemas.openxmlformats.org/officeDocument/2006/math">
+                    <m:r>
+                      <a:rPr lang="en-US" altLang="zh-TW" b="0" i="1" smtClean="0">
+                        <a:latin typeface="Cambria Math" panose="02040503050406030204" pitchFamily="18" charset="0"/>
+                      </a:rPr>
+                      <m:t>𝑛</m:t>
+                    </m:r>
+                    <m:r>
+                      <a:rPr lang="en-US" altLang="zh-TW" b="0" i="1" smtClean="0">
+                        <a:latin typeface="Cambria Math" panose="02040503050406030204" pitchFamily="18" charset="0"/>
+                      </a:rPr>
+                      <m:t>=168</m:t>
+                    </m:r>
+                  </m:oMath>
+                </a14:m>
+                <a:r>
+                  <a:rPr lang="zh-TW" altLang="en-US" dirty="0" smtClean="0"/>
+                  <a:t> </a:t>
+                </a:r>
+                <a:r>
+                  <a:rPr lang="en-US" altLang="zh-TW" dirty="0" smtClean="0"/>
+                  <a:t>and code rate</a:t>
+                </a:r>
+                <a14:m>
+                  <m:oMath xmlns:m="http://schemas.openxmlformats.org/officeDocument/2006/math">
+                    <m:r>
+                      <a:rPr lang="en-US" altLang="zh-TW" b="0" i="0" smtClean="0">
+                        <a:latin typeface="Cambria Math" panose="02040503050406030204" pitchFamily="18" charset="0"/>
+                      </a:rPr>
+                      <m:t> </m:t>
+                    </m:r>
+                    <m:sSub>
+                      <m:sSubPr>
+                        <m:ctrlPr>
+                          <a:rPr lang="en-US" altLang="zh-TW" i="1" smtClean="0">
+                            <a:latin typeface="Cambria Math" panose="02040503050406030204" pitchFamily="18" charset="0"/>
+                          </a:rPr>
+                        </m:ctrlPr>
+                      </m:sSubPr>
+                      <m:e>
+                        <m:r>
+                          <a:rPr lang="en-US" altLang="zh-TW" b="0" i="1" smtClean="0">
+                            <a:latin typeface="Cambria Math" panose="02040503050406030204" pitchFamily="18" charset="0"/>
+                          </a:rPr>
+                          <m:t>𝑅</m:t>
+                        </m:r>
+                      </m:e>
+                      <m:sub>
+                        <m:r>
+                          <a:rPr lang="en-US" altLang="zh-TW" b="0" i="1" smtClean="0">
+                            <a:latin typeface="Cambria Math" panose="02040503050406030204" pitchFamily="18" charset="0"/>
+                          </a:rPr>
+                          <m:t>𝑐</m:t>
+                        </m:r>
+                      </m:sub>
+                    </m:sSub>
+                    <m:r>
+                      <a:rPr lang="en-US" altLang="zh-TW" b="0" i="1" smtClean="0">
+                        <a:latin typeface="Cambria Math" panose="02040503050406030204" pitchFamily="18" charset="0"/>
+                      </a:rPr>
+                      <m:t>=</m:t>
+                    </m:r>
+                    <m:f>
+                      <m:fPr>
+                        <m:type m:val="lin"/>
+                        <m:ctrlPr>
+                          <a:rPr lang="en-US" altLang="zh-TW" b="0" i="1" smtClean="0">
+                            <a:latin typeface="Cambria Math" panose="02040503050406030204" pitchFamily="18" charset="0"/>
+                          </a:rPr>
+                        </m:ctrlPr>
+                      </m:fPr>
+                      <m:num>
+                        <m:r>
+                          <a:rPr lang="en-US" altLang="zh-TW" b="0" i="1" smtClean="0">
+                            <a:latin typeface="Cambria Math" panose="02040503050406030204" pitchFamily="18" charset="0"/>
+                          </a:rPr>
+                          <m:t>5</m:t>
+                        </m:r>
+                      </m:num>
+                      <m:den>
+                        <m:r>
+                          <a:rPr lang="en-US" altLang="zh-TW" b="0" i="1" smtClean="0">
+                            <a:latin typeface="Cambria Math" panose="02040503050406030204" pitchFamily="18" charset="0"/>
+                          </a:rPr>
+                          <m:t>6</m:t>
+                        </m:r>
+                      </m:den>
+                    </m:f>
+                  </m:oMath>
+                </a14:m>
+                <a:endParaRPr lang="en-US" altLang="zh-TW" b="0" dirty="0" smtClean="0"/>
+              </a:p>
+              <a:p>
+                <a:pPr lvl="1"/>
+                <a:r>
+                  <a:rPr lang="en-US" altLang="zh-TW" dirty="0" smtClean="0"/>
+                  <a:t>The LDPC code is given by TS38.212 and shortened from </a:t>
+                </a:r>
+                <a14:m>
+                  <m:oMath xmlns:m="http://schemas.openxmlformats.org/officeDocument/2006/math">
+                    <m:r>
+                      <a:rPr lang="en-US" altLang="zh-TW" i="1">
+                        <a:latin typeface="Cambria Math" panose="02040503050406030204" pitchFamily="18" charset="0"/>
+                      </a:rPr>
+                      <m:t>𝑛</m:t>
+                    </m:r>
+                    <m:r>
+                      <a:rPr lang="en-US" altLang="zh-TW" i="1">
+                        <a:latin typeface="Cambria Math" panose="02040503050406030204" pitchFamily="18" charset="0"/>
+                      </a:rPr>
+                      <m:t>=256</m:t>
+                    </m:r>
+                  </m:oMath>
+                </a14:m>
+                <a:endParaRPr lang="en-US" altLang="zh-TW" dirty="0" smtClean="0"/>
+              </a:p>
+              <a:p>
+                <a:pPr lvl="1"/>
+                <a:r>
+                  <a:rPr lang="en-US" altLang="zh-TW" dirty="0" smtClean="0"/>
+                  <a:t>A packet consists of one </a:t>
+                </a:r>
+                <a:r>
+                  <a:rPr lang="en-US" altLang="zh-TW" dirty="0" err="1" smtClean="0"/>
+                  <a:t>codeword</a:t>
+                </a:r>
+                <a:r>
+                  <a:rPr lang="en-US" altLang="zh-TW" dirty="0" smtClean="0"/>
+                  <a:t>. Hence, </a:t>
+                </a:r>
+                <a:r>
+                  <a:rPr lang="en-US" altLang="zh-TW" dirty="0" err="1" smtClean="0"/>
+                  <a:t>codeword</a:t>
+                </a:r>
+                <a:r>
+                  <a:rPr lang="en-US" altLang="zh-TW" dirty="0" smtClean="0"/>
+                  <a:t> error rate = packet error rate</a:t>
+                </a:r>
+              </a:p>
+              <a:p>
+                <a:r>
+                  <a:rPr lang="en-US" altLang="zh-TW" dirty="0" smtClean="0"/>
+                  <a:t>The minimum hamming distance </a:t>
+                </a:r>
+                <a14:m>
+                  <m:oMath xmlns:m="http://schemas.openxmlformats.org/officeDocument/2006/math">
+                    <m:sSub>
+                      <m:sSubPr>
+                        <m:ctrlPr>
+                          <a:rPr lang="en-US" altLang="zh-TW" i="1" smtClean="0">
+                            <a:latin typeface="Cambria Math" panose="02040503050406030204" pitchFamily="18" charset="0"/>
+                          </a:rPr>
+                        </m:ctrlPr>
+                      </m:sSubPr>
+                      <m:e>
+                        <m:r>
+                          <a:rPr lang="en-US" altLang="zh-TW" b="0" i="1" smtClean="0">
+                            <a:latin typeface="Cambria Math" panose="02040503050406030204" pitchFamily="18" charset="0"/>
+                          </a:rPr>
+                          <m:t>𝑑</m:t>
+                        </m:r>
+                      </m:e>
+                      <m:sub>
+                        <m:r>
+                          <a:rPr lang="en-US" altLang="zh-TW" b="0" i="1" smtClean="0">
+                            <a:latin typeface="Cambria Math" panose="02040503050406030204" pitchFamily="18" charset="0"/>
+                          </a:rPr>
+                          <m:t>𝑚𝑖𝑛</m:t>
+                        </m:r>
+                      </m:sub>
+                    </m:sSub>
+                    <m:r>
+                      <a:rPr lang="en-US" altLang="zh-TW" b="0" i="1" smtClean="0">
+                        <a:latin typeface="Cambria Math" panose="02040503050406030204" pitchFamily="18" charset="0"/>
+                      </a:rPr>
+                      <m:t>=7</m:t>
+                    </m:r>
+                  </m:oMath>
+                </a14:m>
+                <a:endParaRPr lang="en-US" altLang="zh-TW" dirty="0" smtClean="0"/>
+              </a:p>
+              <a:p>
+                <a:r>
+                  <a:rPr lang="en-US" altLang="zh-TW" dirty="0" smtClean="0"/>
+                  <a:t>Due to the low hamming distance compared with the codebook size, the previous bounds become way too loose</a:t>
+                </a:r>
+              </a:p>
+              <a:p>
+                <a:r>
+                  <a:rPr lang="en-US" altLang="zh-TW" dirty="0" smtClean="0"/>
+                  <a:t>We will simulate the </a:t>
+                </a:r>
+                <a:r>
+                  <a:rPr lang="en-US" altLang="zh-TW" dirty="0" err="1" smtClean="0"/>
+                  <a:t>codeword</a:t>
+                </a:r>
+                <a:r>
+                  <a:rPr lang="en-US" altLang="zh-TW" dirty="0" smtClean="0"/>
+                  <a:t> error rate by simulation </a:t>
+                </a:r>
+              </a:p>
+              <a:p>
+                <a:pPr lvl="1"/>
+                <a:r>
+                  <a:rPr lang="en-US" altLang="zh-TW" dirty="0" smtClean="0"/>
+                  <a:t>Rayleigh fading channel </a:t>
+                </a:r>
+                <a:endParaRPr lang="en-US" altLang="zh-TW" dirty="0"/>
+              </a:p>
+              <a:p>
+                <a:pPr lvl="1"/>
+                <a:r>
+                  <a:rPr lang="en-US" altLang="zh-TW" dirty="0" smtClean="0"/>
+                  <a:t>Decoding:</a:t>
+                </a:r>
+                <a:r>
+                  <a:rPr lang="zh-TW" altLang="en-US" dirty="0" smtClean="0"/>
+                  <a:t> </a:t>
+                </a:r>
+                <a:r>
+                  <a:rPr lang="en-US" altLang="zh-TW" smtClean="0"/>
+                  <a:t>product-sum </a:t>
+                </a:r>
+                <a:r>
+                  <a:rPr lang="en-US" altLang="zh-TW" dirty="0" smtClean="0"/>
+                  <a:t>algorithm </a:t>
+                </a:r>
+                <a:r>
+                  <a:rPr lang="en-US" altLang="zh-TW" smtClean="0"/>
+                  <a:t>with 20 iterations</a:t>
+                </a:r>
+                <a:endParaRPr lang="en-US" altLang="zh-TW" dirty="0" smtClean="0"/>
+              </a:p>
+              <a:p>
+                <a:endParaRPr lang="zh-TW" altLang="en-US" dirty="0"/>
+              </a:p>
+            </p:txBody>
+          </p:sp>
+        </mc:Choice>
+        <mc:Fallback>
+          <p:sp>
+            <p:nvSpPr>
+              <p:cNvPr id="3" name="內容版面配置區 2">
+                <a:extLst>
+                  <a:ext uri="{FF2B5EF4-FFF2-40B4-BE49-F238E27FC236}">
+                    <a16:creationId xmlns:a16="http://schemas.microsoft.com/office/drawing/2014/main" id="{ECE538FE-E561-461E-99DC-51E1772CB83B}"/>
+                  </a:ext>
+                </a:extLst>
+              </p:cNvPr>
+              <p:cNvSpPr>
+                <a:spLocks noGrp="1" noRot="1" noChangeAspect="1" noMove="1" noResize="1" noEditPoints="1" noAdjustHandles="1" noChangeArrowheads="1" noChangeShapeType="1" noTextEdit="1"/>
+              </p:cNvSpPr>
+              <p:nvPr>
+                <p:ph idx="1"/>
+              </p:nvPr>
+            </p:nvSpPr>
+            <p:spPr>
+              <a:blipFill>
+                <a:blip r:embed="rId2"/>
+                <a:stretch>
+                  <a:fillRect l="-142" t="-10989"/>
+                </a:stretch>
+              </a:blipFill>
+            </p:spPr>
+            <p:txBody>
+              <a:bodyPr/>
+              <a:lstStyle/>
+              <a:p>
+                <a:r>
+                  <a:rPr lang="zh-TW" altLang="en-US">
+                    <a:noFill/>
+                  </a:rPr>
+                  <a:t> </a:t>
+                </a:r>
+              </a:p>
+            </p:txBody>
+          </p:sp>
+        </mc:Fallback>
+      </mc:AlternateContent>
     </p:spTree>
     <p:extLst>
       <p:ext uri="{BB962C8B-B14F-4D97-AF65-F5344CB8AC3E}">
@@ -6538,7 +6828,7 @@
           </p:nvPr>
         </p:nvPicPr>
         <p:blipFill>
-          <a:blip r:embed="rId5">
+          <a:blip r:embed="rId5" cstate="hqprint">
             <a:extLst>
               <a:ext uri="{28A0092B-C50C-407E-A947-70E740481C1C}">
                 <a14:useLocalDpi xmlns:a14="http://schemas.microsoft.com/office/drawing/2010/main" val="0"/>
@@ -6578,7 +6868,7 @@
           </p:nvPr>
         </p:nvPicPr>
         <p:blipFill>
-          <a:blip r:embed="rId6">
+          <a:blip r:embed="rId6" cstate="hqprint">
             <a:extLst>
               <a:ext uri="{28A0092B-C50C-407E-A947-70E740481C1C}">
                 <a14:useLocalDpi xmlns:a14="http://schemas.microsoft.com/office/drawing/2010/main" val="0"/>
@@ -6618,7 +6908,7 @@
           </p:nvPr>
         </p:nvPicPr>
         <p:blipFill>
-          <a:blip r:embed="rId7">
+          <a:blip r:embed="rId7" cstate="hqprint">
             <a:extLst>
               <a:ext uri="{28A0092B-C50C-407E-A947-70E740481C1C}">
                 <a14:useLocalDpi xmlns:a14="http://schemas.microsoft.com/office/drawing/2010/main" val="0"/>
@@ -6718,13 +7008,13 @@
           <p:nvPr/>
         </p:nvPicPr>
         <p:blipFill>
-          <a:blip r:embed="rId7">
+          <a:blip r:embed="rId7" cstate="hqprint">
             <a:extLst>
               <a:ext uri="{28A0092B-C50C-407E-A947-70E740481C1C}">
                 <a14:useLocalDpi xmlns:a14="http://schemas.microsoft.com/office/drawing/2010/main" val="0"/>
               </a:ext>
               <a:ext uri="{96DAC541-7B7A-43D3-8B79-37D633B846F1}">
-                <asvg:svgBlip xmlns:asvg="http://schemas.microsoft.com/office/drawing/2016/SVG/main" r:embed="rId8"/>
+                <asvg:svgBlip xmlns:asvg="http://schemas.microsoft.com/office/drawing/2016/SVG/main" xmlns="" r:embed="rId8"/>
               </a:ext>
             </a:extLst>
           </a:blip>
@@ -7990,7 +8280,7 @@
           </p:nvPr>
         </p:nvPicPr>
         <p:blipFill>
-          <a:blip r:embed="rId9">
+          <a:blip r:embed="rId9" cstate="hqprint">
             <a:extLst>
               <a:ext uri="{28A0092B-C50C-407E-A947-70E740481C1C}">
                 <a14:useLocalDpi xmlns:a14="http://schemas.microsoft.com/office/drawing/2010/main" val="0"/>
@@ -8688,7 +8978,7 @@
           </p:nvPr>
         </p:nvPicPr>
         <p:blipFill>
-          <a:blip r:embed="rId10">
+          <a:blip r:embed="rId10" cstate="hqprint">
             <a:extLst>
               <a:ext uri="{28A0092B-C50C-407E-A947-70E740481C1C}">
                 <a14:useLocalDpi xmlns:a14="http://schemas.microsoft.com/office/drawing/2010/main" val="0"/>
@@ -8724,13 +9014,13 @@
           <p:nvPr/>
         </p:nvPicPr>
         <p:blipFill>
-          <a:blip r:embed="rId11">
+          <a:blip r:embed="rId11" cstate="hqprint">
             <a:extLst>
               <a:ext uri="{28A0092B-C50C-407E-A947-70E740481C1C}">
                 <a14:useLocalDpi xmlns:a14="http://schemas.microsoft.com/office/drawing/2010/main" val="0"/>
               </a:ext>
               <a:ext uri="{96DAC541-7B7A-43D3-8B79-37D633B846F1}">
-                <asvg:svgBlip xmlns:asvg="http://schemas.microsoft.com/office/drawing/2016/SVG/main" r:embed="rId12"/>
+                <asvg:svgBlip xmlns:asvg="http://schemas.microsoft.com/office/drawing/2016/SVG/main" xmlns="" r:embed="rId12"/>
               </a:ext>
             </a:extLst>
           </a:blip>
@@ -8763,13 +9053,13 @@
           <p:nvPr/>
         </p:nvPicPr>
         <p:blipFill>
-          <a:blip r:embed="rId11">
+          <a:blip r:embed="rId11" cstate="hqprint">
             <a:extLst>
               <a:ext uri="{28A0092B-C50C-407E-A947-70E740481C1C}">
                 <a14:useLocalDpi xmlns:a14="http://schemas.microsoft.com/office/drawing/2010/main" val="0"/>
               </a:ext>
               <a:ext uri="{96DAC541-7B7A-43D3-8B79-37D633B846F1}">
-                <asvg:svgBlip xmlns:asvg="http://schemas.microsoft.com/office/drawing/2016/SVG/main" r:embed="rId12"/>
+                <asvg:svgBlip xmlns:asvg="http://schemas.microsoft.com/office/drawing/2016/SVG/main" xmlns="" r:embed="rId12"/>
               </a:ext>
             </a:extLst>
           </a:blip>
@@ -8802,13 +9092,13 @@
           <p:nvPr/>
         </p:nvPicPr>
         <p:blipFill>
-          <a:blip r:embed="rId11">
+          <a:blip r:embed="rId11" cstate="hqprint">
             <a:extLst>
               <a:ext uri="{28A0092B-C50C-407E-A947-70E740481C1C}">
                 <a14:useLocalDpi xmlns:a14="http://schemas.microsoft.com/office/drawing/2010/main" val="0"/>
               </a:ext>
               <a:ext uri="{96DAC541-7B7A-43D3-8B79-37D633B846F1}">
-                <asvg:svgBlip xmlns:asvg="http://schemas.microsoft.com/office/drawing/2016/SVG/main" r:embed="rId12"/>
+                <asvg:svgBlip xmlns:asvg="http://schemas.microsoft.com/office/drawing/2016/SVG/main" xmlns="" r:embed="rId12"/>
               </a:ext>
             </a:extLst>
           </a:blip>
@@ -8841,13 +9131,13 @@
           <p:nvPr/>
         </p:nvPicPr>
         <p:blipFill>
-          <a:blip r:embed="rId11">
+          <a:blip r:embed="rId11" cstate="hqprint">
             <a:extLst>
               <a:ext uri="{28A0092B-C50C-407E-A947-70E740481C1C}">
                 <a14:useLocalDpi xmlns:a14="http://schemas.microsoft.com/office/drawing/2010/main" val="0"/>
               </a:ext>
               <a:ext uri="{96DAC541-7B7A-43D3-8B79-37D633B846F1}">
-                <asvg:svgBlip xmlns:asvg="http://schemas.microsoft.com/office/drawing/2016/SVG/main" r:embed="rId12"/>
+                <asvg:svgBlip xmlns:asvg="http://schemas.microsoft.com/office/drawing/2016/SVG/main" xmlns="" r:embed="rId12"/>
               </a:ext>
             </a:extLst>
           </a:blip>
@@ -8920,7 +9210,7 @@
           </p:nvPr>
         </p:nvPicPr>
         <p:blipFill>
-          <a:blip r:embed="rId13">
+          <a:blip r:embed="rId13" cstate="hqprint">
             <a:extLst>
               <a:ext uri="{28A0092B-C50C-407E-A947-70E740481C1C}">
                 <a14:useLocalDpi xmlns:a14="http://schemas.microsoft.com/office/drawing/2010/main" val="0"/>
@@ -8999,7 +9289,7 @@
           </p:nvPr>
         </p:nvPicPr>
         <p:blipFill>
-          <a:blip r:embed="rId14">
+          <a:blip r:embed="rId14" cstate="hqprint">
             <a:extLst>
               <a:ext uri="{28A0092B-C50C-407E-A947-70E740481C1C}">
                 <a14:useLocalDpi xmlns:a14="http://schemas.microsoft.com/office/drawing/2010/main" val="0"/>
@@ -9080,7 +9370,7 @@
           </p:nvPr>
         </p:nvPicPr>
         <p:blipFill>
-          <a:blip r:embed="rId15">
+          <a:blip r:embed="rId15" cstate="hqprint">
             <a:extLst>
               <a:ext uri="{28A0092B-C50C-407E-A947-70E740481C1C}">
                 <a14:useLocalDpi xmlns:a14="http://schemas.microsoft.com/office/drawing/2010/main" val="0"/>
@@ -9101,8 +9391,8 @@
           </a:prstGeom>
         </p:spPr>
       </p:pic>
-      <mc:AlternateContent xmlns:mc="http://schemas.openxmlformats.org/markup-compatibility/2006">
-        <mc:Choice xmlns:a14="http://schemas.microsoft.com/office/drawing/2010/main" Requires="a14">
+      <mc:AlternateContent xmlns:mc="http://schemas.openxmlformats.org/markup-compatibility/2006" xmlns:a14="http://schemas.microsoft.com/office/drawing/2010/main">
+        <mc:Choice Requires="a14">
           <p:graphicFrame>
             <p:nvGraphicFramePr>
               <p:cNvPr id="70" name="表格 69">
@@ -9274,6 +9564,7 @@
                         <a:bodyPr/>
                         <a:lstStyle/>
                         <a:p>
+                          <a:pPr/>
                           <a14:m>
                             <m:oMathPara xmlns:m="http://schemas.openxmlformats.org/officeDocument/2006/math">
                               <m:oMathParaPr>
@@ -9424,7 +9715,7 @@
             </a:graphic>
           </p:graphicFrame>
         </mc:Choice>
-        <mc:Fallback>
+        <mc:Fallback xmlns="">
           <p:graphicFrame>
             <p:nvGraphicFramePr>
               <p:cNvPr id="70" name="表格 69">
@@ -9726,8 +10017,8 @@
           </a:p>
         </p:txBody>
       </p:sp>
-      <mc:AlternateContent xmlns:mc="http://schemas.openxmlformats.org/markup-compatibility/2006">
-        <mc:Choice xmlns:a14="http://schemas.microsoft.com/office/drawing/2010/main" Requires="a14">
+      <mc:AlternateContent xmlns:mc="http://schemas.openxmlformats.org/markup-compatibility/2006" xmlns:a14="http://schemas.microsoft.com/office/drawing/2010/main">
+        <mc:Choice Requires="a14">
           <p:graphicFrame>
             <p:nvGraphicFramePr>
               <p:cNvPr id="75" name="表格 74">
@@ -9899,6 +10190,7 @@
                         <a:bodyPr/>
                         <a:lstStyle/>
                         <a:p>
+                          <a:pPr/>
                           <a14:m>
                             <m:oMathPara xmlns:m="http://schemas.openxmlformats.org/officeDocument/2006/math">
                               <m:oMathParaPr>
@@ -10049,7 +10341,7 @@
             </a:graphic>
           </p:graphicFrame>
         </mc:Choice>
-        <mc:Fallback>
+        <mc:Fallback xmlns="">
           <p:graphicFrame>
             <p:nvGraphicFramePr>
               <p:cNvPr id="75" name="表格 74">
@@ -10315,8 +10607,8 @@
           </p:graphicFrame>
         </mc:Fallback>
       </mc:AlternateContent>
-      <mc:AlternateContent xmlns:mc="http://schemas.openxmlformats.org/markup-compatibility/2006">
-        <mc:Choice xmlns:a14="http://schemas.microsoft.com/office/drawing/2010/main" Requires="a14">
+      <mc:AlternateContent xmlns:mc="http://schemas.openxmlformats.org/markup-compatibility/2006" xmlns:a14="http://schemas.microsoft.com/office/drawing/2010/main">
+        <mc:Choice Requires="a14">
           <p:graphicFrame>
             <p:nvGraphicFramePr>
               <p:cNvPr id="76" name="表格 75">
@@ -10488,6 +10780,7 @@
                         <a:bodyPr/>
                         <a:lstStyle/>
                         <a:p>
+                          <a:pPr/>
                           <a14:m>
                             <m:oMathPara xmlns:m="http://schemas.openxmlformats.org/officeDocument/2006/math">
                               <m:oMathParaPr>
@@ -10646,7 +10939,7 @@
             </a:graphic>
           </p:graphicFrame>
         </mc:Choice>
-        <mc:Fallback>
+        <mc:Fallback xmlns="">
           <p:graphicFrame>
             <p:nvGraphicFramePr>
               <p:cNvPr id="76" name="表格 75">
@@ -10920,8 +11213,8 @@
           </p:graphicFrame>
         </mc:Fallback>
       </mc:AlternateContent>
-      <mc:AlternateContent xmlns:mc="http://schemas.openxmlformats.org/markup-compatibility/2006">
-        <mc:Choice xmlns:a14="http://schemas.microsoft.com/office/drawing/2010/main" Requires="a14">
+      <mc:AlternateContent xmlns:mc="http://schemas.openxmlformats.org/markup-compatibility/2006" xmlns:a14="http://schemas.microsoft.com/office/drawing/2010/main">
+        <mc:Choice Requires="a14">
           <p:graphicFrame>
             <p:nvGraphicFramePr>
               <p:cNvPr id="77" name="表格 76">
@@ -11093,6 +11386,7 @@
                         <a:bodyPr/>
                         <a:lstStyle/>
                         <a:p>
+                          <a:pPr/>
                           <a14:m>
                             <m:oMathPara xmlns:m="http://schemas.openxmlformats.org/officeDocument/2006/math">
                               <m:oMathParaPr>
@@ -11243,7 +11537,7 @@
             </a:graphic>
           </p:graphicFrame>
         </mc:Choice>
-        <mc:Fallback>
+        <mc:Fallback xmlns="">
           <p:graphicFrame>
             <p:nvGraphicFramePr>
               <p:cNvPr id="77" name="表格 76">
@@ -11875,7 +12169,7 @@
           </p:nvPr>
         </p:nvPicPr>
         <p:blipFill>
-          <a:blip r:embed="rId8">
+          <a:blip r:embed="rId8" cstate="hqprint">
             <a:extLst>
               <a:ext uri="{28A0092B-C50C-407E-A947-70E740481C1C}">
                 <a14:useLocalDpi xmlns:a14="http://schemas.microsoft.com/office/drawing/2010/main" val="0"/>
@@ -11915,7 +12209,7 @@
           </p:nvPr>
         </p:nvPicPr>
         <p:blipFill>
-          <a:blip r:embed="rId9">
+          <a:blip r:embed="rId9" cstate="hqprint">
             <a:extLst>
               <a:ext uri="{28A0092B-C50C-407E-A947-70E740481C1C}">
                 <a14:useLocalDpi xmlns:a14="http://schemas.microsoft.com/office/drawing/2010/main" val="0"/>
@@ -11955,7 +12249,7 @@
           </p:nvPr>
         </p:nvPicPr>
         <p:blipFill>
-          <a:blip r:embed="rId10">
+          <a:blip r:embed="rId10" cstate="hqprint">
             <a:extLst>
               <a:ext uri="{28A0092B-C50C-407E-A947-70E740481C1C}">
                 <a14:useLocalDpi xmlns:a14="http://schemas.microsoft.com/office/drawing/2010/main" val="0"/>
@@ -11995,7 +12289,7 @@
           </p:nvPr>
         </p:nvPicPr>
         <p:blipFill>
-          <a:blip r:embed="rId11">
+          <a:blip r:embed="rId11" cstate="hqprint">
             <a:extLst>
               <a:ext uri="{28A0092B-C50C-407E-A947-70E740481C1C}">
                 <a14:useLocalDpi xmlns:a14="http://schemas.microsoft.com/office/drawing/2010/main" val="0"/>
@@ -12035,7 +12329,7 @@
           </p:nvPr>
         </p:nvPicPr>
         <p:blipFill>
-          <a:blip r:embed="rId12">
+          <a:blip r:embed="rId12" cstate="hqprint">
             <a:extLst>
               <a:ext uri="{28A0092B-C50C-407E-A947-70E740481C1C}">
                 <a14:useLocalDpi xmlns:a14="http://schemas.microsoft.com/office/drawing/2010/main" val="0"/>
@@ -12119,8 +12413,8 @@
           </a:p>
         </p:txBody>
       </p:sp>
-      <mc:AlternateContent xmlns:mc="http://schemas.openxmlformats.org/markup-compatibility/2006">
-        <mc:Choice xmlns:a14="http://schemas.microsoft.com/office/drawing/2010/main" Requires="a14">
+      <mc:AlternateContent xmlns:mc="http://schemas.openxmlformats.org/markup-compatibility/2006" xmlns:a14="http://schemas.microsoft.com/office/drawing/2010/main">
+        <mc:Choice Requires="a14">
           <p:sp>
             <p:nvSpPr>
               <p:cNvPr id="3" name="內容版面配置區 2">
@@ -12648,7 +12942,7 @@
             </p:txBody>
           </p:sp>
         </mc:Choice>
-        <mc:Fallback>
+        <mc:Fallback xmlns="">
           <p:sp>
             <p:nvSpPr>
               <p:cNvPr id="3" name="內容版面配置區 2">
@@ -12775,13 +13069,13 @@
           <p:nvPr/>
         </p:nvPicPr>
         <p:blipFill>
-          <a:blip r:embed="rId8">
+          <a:blip r:embed="rId8" cstate="hqprint">
             <a:extLst>
               <a:ext uri="{28A0092B-C50C-407E-A947-70E740481C1C}">
                 <a14:useLocalDpi xmlns:a14="http://schemas.microsoft.com/office/drawing/2010/main" val="0"/>
               </a:ext>
               <a:ext uri="{96DAC541-7B7A-43D3-8B79-37D633B846F1}">
-                <asvg:svgBlip xmlns:asvg="http://schemas.microsoft.com/office/drawing/2016/SVG/main" r:embed="rId9"/>
+                <asvg:svgBlip xmlns:asvg="http://schemas.microsoft.com/office/drawing/2016/SVG/main" xmlns="" r:embed="rId9"/>
               </a:ext>
             </a:extLst>
           </a:blip>
@@ -13098,7 +13392,7 @@
           </p:nvPr>
         </p:nvPicPr>
         <p:blipFill>
-          <a:blip r:embed="rId10">
+          <a:blip r:embed="rId10" cstate="hqprint">
             <a:extLst>
               <a:ext uri="{28A0092B-C50C-407E-A947-70E740481C1C}">
                 <a14:useLocalDpi xmlns:a14="http://schemas.microsoft.com/office/drawing/2010/main" val="0"/>
@@ -13134,13 +13428,13 @@
           <p:nvPr/>
         </p:nvPicPr>
         <p:blipFill>
-          <a:blip r:embed="rId11">
+          <a:blip r:embed="rId11" cstate="hqprint">
             <a:extLst>
               <a:ext uri="{28A0092B-C50C-407E-A947-70E740481C1C}">
                 <a14:useLocalDpi xmlns:a14="http://schemas.microsoft.com/office/drawing/2010/main" val="0"/>
               </a:ext>
               <a:ext uri="{96DAC541-7B7A-43D3-8B79-37D633B846F1}">
-                <asvg:svgBlip xmlns:asvg="http://schemas.microsoft.com/office/drawing/2016/SVG/main" r:embed="rId12"/>
+                <asvg:svgBlip xmlns:asvg="http://schemas.microsoft.com/office/drawing/2016/SVG/main" xmlns="" r:embed="rId12"/>
               </a:ext>
             </a:extLst>
           </a:blip>
@@ -13173,13 +13467,13 @@
           <p:nvPr/>
         </p:nvPicPr>
         <p:blipFill>
-          <a:blip r:embed="rId11">
+          <a:blip r:embed="rId11" cstate="hqprint">
             <a:extLst>
               <a:ext uri="{28A0092B-C50C-407E-A947-70E740481C1C}">
                 <a14:useLocalDpi xmlns:a14="http://schemas.microsoft.com/office/drawing/2010/main" val="0"/>
               </a:ext>
               <a:ext uri="{96DAC541-7B7A-43D3-8B79-37D633B846F1}">
-                <asvg:svgBlip xmlns:asvg="http://schemas.microsoft.com/office/drawing/2016/SVG/main" r:embed="rId12"/>
+                <asvg:svgBlip xmlns:asvg="http://schemas.microsoft.com/office/drawing/2016/SVG/main" xmlns="" r:embed="rId12"/>
               </a:ext>
             </a:extLst>
           </a:blip>
@@ -13212,13 +13506,13 @@
           <p:nvPr/>
         </p:nvPicPr>
         <p:blipFill>
-          <a:blip r:embed="rId11">
+          <a:blip r:embed="rId11" cstate="hqprint">
             <a:extLst>
               <a:ext uri="{28A0092B-C50C-407E-A947-70E740481C1C}">
                 <a14:useLocalDpi xmlns:a14="http://schemas.microsoft.com/office/drawing/2010/main" val="0"/>
               </a:ext>
               <a:ext uri="{96DAC541-7B7A-43D3-8B79-37D633B846F1}">
-                <asvg:svgBlip xmlns:asvg="http://schemas.microsoft.com/office/drawing/2016/SVG/main" r:embed="rId12"/>
+                <asvg:svgBlip xmlns:asvg="http://schemas.microsoft.com/office/drawing/2016/SVG/main" xmlns="" r:embed="rId12"/>
               </a:ext>
             </a:extLst>
           </a:blip>
@@ -13251,13 +13545,13 @@
           <p:nvPr/>
         </p:nvPicPr>
         <p:blipFill>
-          <a:blip r:embed="rId11">
+          <a:blip r:embed="rId11" cstate="hqprint">
             <a:extLst>
               <a:ext uri="{28A0092B-C50C-407E-A947-70E740481C1C}">
                 <a14:useLocalDpi xmlns:a14="http://schemas.microsoft.com/office/drawing/2010/main" val="0"/>
               </a:ext>
               <a:ext uri="{96DAC541-7B7A-43D3-8B79-37D633B846F1}">
-                <asvg:svgBlip xmlns:asvg="http://schemas.microsoft.com/office/drawing/2016/SVG/main" r:embed="rId12"/>
+                <asvg:svgBlip xmlns:asvg="http://schemas.microsoft.com/office/drawing/2016/SVG/main" xmlns="" r:embed="rId12"/>
               </a:ext>
             </a:extLst>
           </a:blip>
@@ -13330,7 +13624,7 @@
           </p:nvPr>
         </p:nvPicPr>
         <p:blipFill>
-          <a:blip r:embed="rId13">
+          <a:blip r:embed="rId13" cstate="hqprint">
             <a:extLst>
               <a:ext uri="{28A0092B-C50C-407E-A947-70E740481C1C}">
                 <a14:useLocalDpi xmlns:a14="http://schemas.microsoft.com/office/drawing/2010/main" val="0"/>
@@ -13409,7 +13703,7 @@
           </p:nvPr>
         </p:nvPicPr>
         <p:blipFill>
-          <a:blip r:embed="rId14">
+          <a:blip r:embed="rId14" cstate="hqprint">
             <a:extLst>
               <a:ext uri="{28A0092B-C50C-407E-A947-70E740481C1C}">
                 <a14:useLocalDpi xmlns:a14="http://schemas.microsoft.com/office/drawing/2010/main" val="0"/>
@@ -13490,7 +13784,7 @@
           </p:nvPr>
         </p:nvPicPr>
         <p:blipFill>
-          <a:blip r:embed="rId15">
+          <a:blip r:embed="rId15" cstate="hqprint">
             <a:extLst>
               <a:ext uri="{28A0092B-C50C-407E-A947-70E740481C1C}">
                 <a14:useLocalDpi xmlns:a14="http://schemas.microsoft.com/office/drawing/2010/main" val="0"/>
@@ -13511,8 +13805,8 @@
           </a:prstGeom>
         </p:spPr>
       </p:pic>
-      <mc:AlternateContent xmlns:mc="http://schemas.openxmlformats.org/markup-compatibility/2006">
-        <mc:Choice xmlns:a14="http://schemas.microsoft.com/office/drawing/2010/main" Requires="a14">
+      <mc:AlternateContent xmlns:mc="http://schemas.openxmlformats.org/markup-compatibility/2006" xmlns:a14="http://schemas.microsoft.com/office/drawing/2010/main">
+        <mc:Choice Requires="a14">
           <p:graphicFrame>
             <p:nvGraphicFramePr>
               <p:cNvPr id="70" name="表格 69">
@@ -13621,6 +13915,7 @@
                         <a:bodyPr/>
                         <a:lstStyle/>
                         <a:p>
+                          <a:pPr/>
                           <a14:m>
                             <m:oMathPara xmlns:m="http://schemas.openxmlformats.org/officeDocument/2006/math">
                               <m:oMathParaPr>
@@ -13737,7 +14032,7 @@
             </a:graphic>
           </p:graphicFrame>
         </mc:Choice>
-        <mc:Fallback>
+        <mc:Fallback xmlns="">
           <p:graphicFrame>
             <p:nvGraphicFramePr>
               <p:cNvPr id="70" name="表格 69">
@@ -13906,8 +14201,8 @@
           </p:graphicFrame>
         </mc:Fallback>
       </mc:AlternateContent>
-      <mc:AlternateContent xmlns:mc="http://schemas.openxmlformats.org/markup-compatibility/2006">
-        <mc:Choice xmlns:a14="http://schemas.microsoft.com/office/drawing/2010/main" Requires="a14">
+      <mc:AlternateContent xmlns:mc="http://schemas.openxmlformats.org/markup-compatibility/2006" xmlns:a14="http://schemas.microsoft.com/office/drawing/2010/main">
+        <mc:Choice Requires="a14">
           <p:graphicFrame>
             <p:nvGraphicFramePr>
               <p:cNvPr id="75" name="表格 74">
@@ -14016,6 +14311,7 @@
                         <a:bodyPr/>
                         <a:lstStyle/>
                         <a:p>
+                          <a:pPr/>
                           <a14:m>
                             <m:oMathPara xmlns:m="http://schemas.openxmlformats.org/officeDocument/2006/math">
                               <m:oMathParaPr>
@@ -14130,7 +14426,7 @@
             </a:graphic>
           </p:graphicFrame>
         </mc:Choice>
-        <mc:Fallback>
+        <mc:Fallback xmlns="">
           <p:graphicFrame>
             <p:nvGraphicFramePr>
               <p:cNvPr id="75" name="表格 74">
@@ -14291,8 +14587,8 @@
           </p:graphicFrame>
         </mc:Fallback>
       </mc:AlternateContent>
-      <mc:AlternateContent xmlns:mc="http://schemas.openxmlformats.org/markup-compatibility/2006">
-        <mc:Choice xmlns:a14="http://schemas.microsoft.com/office/drawing/2010/main" Requires="a14">
+      <mc:AlternateContent xmlns:mc="http://schemas.openxmlformats.org/markup-compatibility/2006" xmlns:a14="http://schemas.microsoft.com/office/drawing/2010/main">
+        <mc:Choice Requires="a14">
           <p:graphicFrame>
             <p:nvGraphicFramePr>
               <p:cNvPr id="76" name="表格 75">
@@ -14401,6 +14697,7 @@
                         <a:bodyPr/>
                         <a:lstStyle/>
                         <a:p>
+                          <a:pPr/>
                           <a14:m>
                             <m:oMathPara xmlns:m="http://schemas.openxmlformats.org/officeDocument/2006/math">
                               <m:oMathParaPr>
@@ -14517,7 +14814,7 @@
             </a:graphic>
           </p:graphicFrame>
         </mc:Choice>
-        <mc:Fallback>
+        <mc:Fallback xmlns="">
           <p:graphicFrame>
             <p:nvGraphicFramePr>
               <p:cNvPr id="76" name="表格 75">
@@ -14686,8 +14983,8 @@
           </p:graphicFrame>
         </mc:Fallback>
       </mc:AlternateContent>
-      <mc:AlternateContent xmlns:mc="http://schemas.openxmlformats.org/markup-compatibility/2006">
-        <mc:Choice xmlns:a14="http://schemas.microsoft.com/office/drawing/2010/main" Requires="a14">
+      <mc:AlternateContent xmlns:mc="http://schemas.openxmlformats.org/markup-compatibility/2006" xmlns:a14="http://schemas.microsoft.com/office/drawing/2010/main">
+        <mc:Choice Requires="a14">
           <p:graphicFrame>
             <p:nvGraphicFramePr>
               <p:cNvPr id="77" name="表格 76">
@@ -14796,6 +15093,7 @@
                         <a:bodyPr/>
                         <a:lstStyle/>
                         <a:p>
+                          <a:pPr/>
                           <a14:m>
                             <m:oMathPara xmlns:m="http://schemas.openxmlformats.org/officeDocument/2006/math">
                               <m:oMathParaPr>
@@ -14904,7 +15202,7 @@
             </a:graphic>
           </p:graphicFrame>
         </mc:Choice>
-        <mc:Fallback>
+        <mc:Fallback xmlns="">
           <p:graphicFrame>
             <p:nvGraphicFramePr>
               <p:cNvPr id="77" name="表格 76">
@@ -15514,8 +15812,8 @@
           </a:p>
         </p:txBody>
       </p:sp>
-      <mc:AlternateContent xmlns:mc="http://schemas.openxmlformats.org/markup-compatibility/2006">
-        <mc:Choice xmlns:a14="http://schemas.microsoft.com/office/drawing/2010/main" Requires="a14">
+      <mc:AlternateContent xmlns:mc="http://schemas.openxmlformats.org/markup-compatibility/2006" xmlns:a14="http://schemas.microsoft.com/office/drawing/2010/main">
+        <mc:Choice Requires="a14">
           <p:graphicFrame>
             <p:nvGraphicFramePr>
               <p:cNvPr id="79" name="表格 78">
@@ -15624,6 +15922,7 @@
                         <a:bodyPr/>
                         <a:lstStyle/>
                         <a:p>
+                          <a:pPr/>
                           <a14:m>
                             <m:oMathPara xmlns:m="http://schemas.openxmlformats.org/officeDocument/2006/math">
                               <m:oMathParaPr>
@@ -15732,7 +16031,7 @@
             </a:graphic>
           </p:graphicFrame>
         </mc:Choice>
-        <mc:Fallback>
+        <mc:Fallback xmlns="">
           <p:graphicFrame>
             <p:nvGraphicFramePr>
               <p:cNvPr id="79" name="表格 78">
@@ -15893,8 +16192,8 @@
           </p:graphicFrame>
         </mc:Fallback>
       </mc:AlternateContent>
-      <mc:AlternateContent xmlns:mc="http://schemas.openxmlformats.org/markup-compatibility/2006">
-        <mc:Choice xmlns:a14="http://schemas.microsoft.com/office/drawing/2010/main" Requires="a14">
+      <mc:AlternateContent xmlns:mc="http://schemas.openxmlformats.org/markup-compatibility/2006" xmlns:a14="http://schemas.microsoft.com/office/drawing/2010/main">
+        <mc:Choice Requires="a14">
           <p:graphicFrame>
             <p:nvGraphicFramePr>
               <p:cNvPr id="81" name="表格 80">
@@ -16003,6 +16302,7 @@
                         <a:bodyPr/>
                         <a:lstStyle/>
                         <a:p>
+                          <a:pPr/>
                           <a14:m>
                             <m:oMathPara xmlns:m="http://schemas.openxmlformats.org/officeDocument/2006/math">
                               <m:oMathParaPr>
@@ -16111,7 +16411,7 @@
             </a:graphic>
           </p:graphicFrame>
         </mc:Choice>
-        <mc:Fallback>
+        <mc:Fallback xmlns="">
           <p:graphicFrame>
             <p:nvGraphicFramePr>
               <p:cNvPr id="81" name="表格 80">
@@ -16272,8 +16572,8 @@
           </p:graphicFrame>
         </mc:Fallback>
       </mc:AlternateContent>
-      <mc:AlternateContent xmlns:mc="http://schemas.openxmlformats.org/markup-compatibility/2006">
-        <mc:Choice xmlns:a14="http://schemas.microsoft.com/office/drawing/2010/main" Requires="a14">
+      <mc:AlternateContent xmlns:mc="http://schemas.openxmlformats.org/markup-compatibility/2006" xmlns:a14="http://schemas.microsoft.com/office/drawing/2010/main">
+        <mc:Choice Requires="a14">
           <p:graphicFrame>
             <p:nvGraphicFramePr>
               <p:cNvPr id="82" name="表格 81">
@@ -16382,6 +16682,7 @@
                         <a:bodyPr/>
                         <a:lstStyle/>
                         <a:p>
+                          <a:pPr/>
                           <a14:m>
                             <m:oMathPara xmlns:m="http://schemas.openxmlformats.org/officeDocument/2006/math">
                               <m:oMathParaPr>
@@ -16498,7 +16799,7 @@
             </a:graphic>
           </p:graphicFrame>
         </mc:Choice>
-        <mc:Fallback>
+        <mc:Fallback xmlns="">
           <p:graphicFrame>
             <p:nvGraphicFramePr>
               <p:cNvPr id="82" name="表格 81">
@@ -16667,8 +16968,8 @@
           </p:graphicFrame>
         </mc:Fallback>
       </mc:AlternateContent>
-      <mc:AlternateContent xmlns:mc="http://schemas.openxmlformats.org/markup-compatibility/2006">
-        <mc:Choice xmlns:a14="http://schemas.microsoft.com/office/drawing/2010/main" Requires="a14">
+      <mc:AlternateContent xmlns:mc="http://schemas.openxmlformats.org/markup-compatibility/2006" xmlns:a14="http://schemas.microsoft.com/office/drawing/2010/main">
+        <mc:Choice Requires="a14">
           <p:graphicFrame>
             <p:nvGraphicFramePr>
               <p:cNvPr id="83" name="表格 82">
@@ -16777,6 +17078,7 @@
                         <a:bodyPr/>
                         <a:lstStyle/>
                         <a:p>
+                          <a:pPr/>
                           <a14:m>
                             <m:oMathPara xmlns:m="http://schemas.openxmlformats.org/officeDocument/2006/math">
                               <m:oMathParaPr>
@@ -16885,7 +17187,7 @@
             </a:graphic>
           </p:graphicFrame>
         </mc:Choice>
-        <mc:Fallback>
+        <mc:Fallback xmlns="">
           <p:graphicFrame>
             <p:nvGraphicFramePr>
               <p:cNvPr id="83" name="表格 82">
@@ -17061,13 +17363,13 @@
           <p:nvPr/>
         </p:nvPicPr>
         <p:blipFill>
-          <a:blip r:embed="rId8">
+          <a:blip r:embed="rId8" cstate="hqprint">
             <a:extLst>
               <a:ext uri="{28A0092B-C50C-407E-A947-70E740481C1C}">
                 <a14:useLocalDpi xmlns:a14="http://schemas.microsoft.com/office/drawing/2010/main" val="0"/>
               </a:ext>
               <a:ext uri="{96DAC541-7B7A-43D3-8B79-37D633B846F1}">
-                <asvg:svgBlip xmlns:asvg="http://schemas.microsoft.com/office/drawing/2016/SVG/main" r:embed="rId9"/>
+                <asvg:svgBlip xmlns:asvg="http://schemas.microsoft.com/office/drawing/2016/SVG/main" xmlns="" r:embed="rId9"/>
               </a:ext>
             </a:extLst>
           </a:blip>
@@ -17100,13 +17402,13 @@
           <p:nvPr/>
         </p:nvPicPr>
         <p:blipFill>
-          <a:blip r:embed="rId11">
+          <a:blip r:embed="rId11" cstate="hqprint">
             <a:extLst>
               <a:ext uri="{28A0092B-C50C-407E-A947-70E740481C1C}">
                 <a14:useLocalDpi xmlns:a14="http://schemas.microsoft.com/office/drawing/2010/main" val="0"/>
               </a:ext>
               <a:ext uri="{96DAC541-7B7A-43D3-8B79-37D633B846F1}">
-                <asvg:svgBlip xmlns:asvg="http://schemas.microsoft.com/office/drawing/2016/SVG/main" r:embed="rId12"/>
+                <asvg:svgBlip xmlns:asvg="http://schemas.microsoft.com/office/drawing/2016/SVG/main" xmlns="" r:embed="rId12"/>
               </a:ext>
             </a:extLst>
           </a:blip>
@@ -17139,13 +17441,13 @@
           <p:nvPr/>
         </p:nvPicPr>
         <p:blipFill>
-          <a:blip r:embed="rId11">
+          <a:blip r:embed="rId11" cstate="hqprint">
             <a:extLst>
               <a:ext uri="{28A0092B-C50C-407E-A947-70E740481C1C}">
                 <a14:useLocalDpi xmlns:a14="http://schemas.microsoft.com/office/drawing/2010/main" val="0"/>
               </a:ext>
               <a:ext uri="{96DAC541-7B7A-43D3-8B79-37D633B846F1}">
-                <asvg:svgBlip xmlns:asvg="http://schemas.microsoft.com/office/drawing/2016/SVG/main" r:embed="rId12"/>
+                <asvg:svgBlip xmlns:asvg="http://schemas.microsoft.com/office/drawing/2016/SVG/main" xmlns="" r:embed="rId12"/>
               </a:ext>
             </a:extLst>
           </a:blip>
@@ -17178,13 +17480,13 @@
           <p:nvPr/>
         </p:nvPicPr>
         <p:blipFill>
-          <a:blip r:embed="rId11">
+          <a:blip r:embed="rId11" cstate="hqprint">
             <a:extLst>
               <a:ext uri="{28A0092B-C50C-407E-A947-70E740481C1C}">
                 <a14:useLocalDpi xmlns:a14="http://schemas.microsoft.com/office/drawing/2010/main" val="0"/>
               </a:ext>
               <a:ext uri="{96DAC541-7B7A-43D3-8B79-37D633B846F1}">
-                <asvg:svgBlip xmlns:asvg="http://schemas.microsoft.com/office/drawing/2016/SVG/main" r:embed="rId12"/>
+                <asvg:svgBlip xmlns:asvg="http://schemas.microsoft.com/office/drawing/2016/SVG/main" xmlns="" r:embed="rId12"/>
               </a:ext>
             </a:extLst>
           </a:blip>
@@ -17217,13 +17519,13 @@
           <p:nvPr/>
         </p:nvPicPr>
         <p:blipFill>
-          <a:blip r:embed="rId11">
+          <a:blip r:embed="rId11" cstate="hqprint">
             <a:extLst>
               <a:ext uri="{28A0092B-C50C-407E-A947-70E740481C1C}">
                 <a14:useLocalDpi xmlns:a14="http://schemas.microsoft.com/office/drawing/2010/main" val="0"/>
               </a:ext>
               <a:ext uri="{96DAC541-7B7A-43D3-8B79-37D633B846F1}">
-                <asvg:svgBlip xmlns:asvg="http://schemas.microsoft.com/office/drawing/2016/SVG/main" r:embed="rId12"/>
+                <asvg:svgBlip xmlns:asvg="http://schemas.microsoft.com/office/drawing/2016/SVG/main" xmlns="" r:embed="rId12"/>
               </a:ext>
             </a:extLst>
           </a:blip>
@@ -17296,7 +17598,7 @@
           </p:nvPr>
         </p:nvPicPr>
         <p:blipFill>
-          <a:blip r:embed="rId13">
+          <a:blip r:embed="rId13" cstate="hqprint">
             <a:extLst>
               <a:ext uri="{28A0092B-C50C-407E-A947-70E740481C1C}">
                 <a14:useLocalDpi xmlns:a14="http://schemas.microsoft.com/office/drawing/2010/main" val="0"/>
@@ -17631,13 +17933,13 @@
           <p:nvPr/>
         </p:nvPicPr>
         <p:blipFill>
-          <a:blip r:embed="rId8">
+          <a:blip r:embed="rId8" cstate="hqprint">
             <a:extLst>
               <a:ext uri="{28A0092B-C50C-407E-A947-70E740481C1C}">
                 <a14:useLocalDpi xmlns:a14="http://schemas.microsoft.com/office/drawing/2010/main" val="0"/>
               </a:ext>
               <a:ext uri="{96DAC541-7B7A-43D3-8B79-37D633B846F1}">
-                <asvg:svgBlip xmlns:asvg="http://schemas.microsoft.com/office/drawing/2016/SVG/main" r:embed="rId9"/>
+                <asvg:svgBlip xmlns:asvg="http://schemas.microsoft.com/office/drawing/2016/SVG/main" xmlns="" r:embed="rId9"/>
               </a:ext>
             </a:extLst>
           </a:blip>
@@ -17848,7 +18150,7 @@
           </p:nvPr>
         </p:nvPicPr>
         <p:blipFill>
-          <a:blip r:embed="rId24">
+          <a:blip r:embed="rId24" cstate="hqprint">
             <a:extLst>
               <a:ext uri="{28A0092B-C50C-407E-A947-70E740481C1C}">
                 <a14:useLocalDpi xmlns:a14="http://schemas.microsoft.com/office/drawing/2010/main" val="0"/>
@@ -17928,8 +18230,8 @@
           </a:p>
         </p:txBody>
       </p:sp>
-      <mc:AlternateContent xmlns:mc="http://schemas.openxmlformats.org/markup-compatibility/2006">
-        <mc:Choice xmlns:a14="http://schemas.microsoft.com/office/drawing/2010/main" Requires="a14">
+      <mc:AlternateContent xmlns:mc="http://schemas.openxmlformats.org/markup-compatibility/2006" xmlns:a14="http://schemas.microsoft.com/office/drawing/2010/main">
+        <mc:Choice Requires="a14">
           <p:sp>
             <p:nvSpPr>
               <p:cNvPr id="3" name="內容版面配置區 2">
@@ -18115,7 +18417,7 @@
             </p:txBody>
           </p:sp>
         </mc:Choice>
-        <mc:Fallback>
+        <mc:Fallback xmlns="">
           <p:sp>
             <p:nvSpPr>
               <p:cNvPr id="3" name="內容版面配置區 2">
@@ -18178,7 +18480,7 @@
           </p:nvPr>
         </p:nvPicPr>
         <p:blipFill>
-          <a:blip r:embed="rId5">
+          <a:blip r:embed="rId5" cstate="hqprint">
             <a:extLst>
               <a:ext uri="{28A0092B-C50C-407E-A947-70E740481C1C}">
                 <a14:useLocalDpi xmlns:a14="http://schemas.microsoft.com/office/drawing/2010/main" val="0"/>
@@ -18218,7 +18520,7 @@
           </p:nvPr>
         </p:nvPicPr>
         <p:blipFill>
-          <a:blip r:embed="rId6">
+          <a:blip r:embed="rId6" cstate="hqprint">
             <a:extLst>
               <a:ext uri="{28A0092B-C50C-407E-A947-70E740481C1C}">
                 <a14:useLocalDpi xmlns:a14="http://schemas.microsoft.com/office/drawing/2010/main" val="0"/>
@@ -18461,7 +18763,7 @@
           </p:nvPr>
         </p:nvPicPr>
         <p:blipFill>
-          <a:blip r:embed="rId3">
+          <a:blip r:embed="rId3" cstate="hqprint">
             <a:extLst>
               <a:ext uri="{28A0092B-C50C-407E-A947-70E740481C1C}">
                 <a14:useLocalDpi xmlns:a14="http://schemas.microsoft.com/office/drawing/2010/main" val="0"/>
@@ -18565,13 +18867,13 @@
           <p:nvPr/>
         </p:nvPicPr>
         <p:blipFill>
-          <a:blip r:embed="rId11">
+          <a:blip r:embed="rId11" cstate="hqprint">
             <a:extLst>
               <a:ext uri="{28A0092B-C50C-407E-A947-70E740481C1C}">
                 <a14:useLocalDpi xmlns:a14="http://schemas.microsoft.com/office/drawing/2010/main" val="0"/>
               </a:ext>
               <a:ext uri="{96DAC541-7B7A-43D3-8B79-37D633B846F1}">
-                <asvg:svgBlip xmlns:asvg="http://schemas.microsoft.com/office/drawing/2016/SVG/main" r:embed="rId12"/>
+                <asvg:svgBlip xmlns:asvg="http://schemas.microsoft.com/office/drawing/2016/SVG/main" xmlns="" r:embed="rId12"/>
               </a:ext>
             </a:extLst>
           </a:blip>
@@ -18888,7 +19190,7 @@
           </p:nvPr>
         </p:nvPicPr>
         <p:blipFill>
-          <a:blip r:embed="rId13">
+          <a:blip r:embed="rId13" cstate="hqprint">
             <a:extLst>
               <a:ext uri="{28A0092B-C50C-407E-A947-70E740481C1C}">
                 <a14:useLocalDpi xmlns:a14="http://schemas.microsoft.com/office/drawing/2010/main" val="0"/>
@@ -18924,13 +19226,13 @@
           <p:nvPr/>
         </p:nvPicPr>
         <p:blipFill>
-          <a:blip r:embed="rId14">
+          <a:blip r:embed="rId14" cstate="hqprint">
             <a:extLst>
               <a:ext uri="{28A0092B-C50C-407E-A947-70E740481C1C}">
                 <a14:useLocalDpi xmlns:a14="http://schemas.microsoft.com/office/drawing/2010/main" val="0"/>
               </a:ext>
               <a:ext uri="{96DAC541-7B7A-43D3-8B79-37D633B846F1}">
-                <asvg:svgBlip xmlns:asvg="http://schemas.microsoft.com/office/drawing/2016/SVG/main" r:embed="rId15"/>
+                <asvg:svgBlip xmlns:asvg="http://schemas.microsoft.com/office/drawing/2016/SVG/main" xmlns="" r:embed="rId15"/>
               </a:ext>
             </a:extLst>
           </a:blip>
@@ -18963,13 +19265,13 @@
           <p:nvPr/>
         </p:nvPicPr>
         <p:blipFill>
-          <a:blip r:embed="rId14">
+          <a:blip r:embed="rId14" cstate="hqprint">
             <a:extLst>
               <a:ext uri="{28A0092B-C50C-407E-A947-70E740481C1C}">
                 <a14:useLocalDpi xmlns:a14="http://schemas.microsoft.com/office/drawing/2010/main" val="0"/>
               </a:ext>
               <a:ext uri="{96DAC541-7B7A-43D3-8B79-37D633B846F1}">
-                <asvg:svgBlip xmlns:asvg="http://schemas.microsoft.com/office/drawing/2016/SVG/main" r:embed="rId15"/>
+                <asvg:svgBlip xmlns:asvg="http://schemas.microsoft.com/office/drawing/2016/SVG/main" xmlns="" r:embed="rId15"/>
               </a:ext>
             </a:extLst>
           </a:blip>
@@ -19002,13 +19304,13 @@
           <p:nvPr/>
         </p:nvPicPr>
         <p:blipFill>
-          <a:blip r:embed="rId14">
+          <a:blip r:embed="rId14" cstate="hqprint">
             <a:extLst>
               <a:ext uri="{28A0092B-C50C-407E-A947-70E740481C1C}">
                 <a14:useLocalDpi xmlns:a14="http://schemas.microsoft.com/office/drawing/2010/main" val="0"/>
               </a:ext>
               <a:ext uri="{96DAC541-7B7A-43D3-8B79-37D633B846F1}">
-                <asvg:svgBlip xmlns:asvg="http://schemas.microsoft.com/office/drawing/2016/SVG/main" r:embed="rId15"/>
+                <asvg:svgBlip xmlns:asvg="http://schemas.microsoft.com/office/drawing/2016/SVG/main" xmlns="" r:embed="rId15"/>
               </a:ext>
             </a:extLst>
           </a:blip>
@@ -19041,13 +19343,13 @@
           <p:nvPr/>
         </p:nvPicPr>
         <p:blipFill>
-          <a:blip r:embed="rId14">
+          <a:blip r:embed="rId14" cstate="hqprint">
             <a:extLst>
               <a:ext uri="{28A0092B-C50C-407E-A947-70E740481C1C}">
                 <a14:useLocalDpi xmlns:a14="http://schemas.microsoft.com/office/drawing/2010/main" val="0"/>
               </a:ext>
               <a:ext uri="{96DAC541-7B7A-43D3-8B79-37D633B846F1}">
-                <asvg:svgBlip xmlns:asvg="http://schemas.microsoft.com/office/drawing/2016/SVG/main" r:embed="rId15"/>
+                <asvg:svgBlip xmlns:asvg="http://schemas.microsoft.com/office/drawing/2016/SVG/main" xmlns="" r:embed="rId15"/>
               </a:ext>
             </a:extLst>
           </a:blip>
@@ -19120,7 +19422,7 @@
           </p:nvPr>
         </p:nvPicPr>
         <p:blipFill>
-          <a:blip r:embed="rId16">
+          <a:blip r:embed="rId16" cstate="hqprint">
             <a:extLst>
               <a:ext uri="{28A0092B-C50C-407E-A947-70E740481C1C}">
                 <a14:useLocalDpi xmlns:a14="http://schemas.microsoft.com/office/drawing/2010/main" val="0"/>
@@ -19199,7 +19501,7 @@
           </p:nvPr>
         </p:nvPicPr>
         <p:blipFill>
-          <a:blip r:embed="rId17">
+          <a:blip r:embed="rId17" cstate="hqprint">
             <a:extLst>
               <a:ext uri="{28A0092B-C50C-407E-A947-70E740481C1C}">
                 <a14:useLocalDpi xmlns:a14="http://schemas.microsoft.com/office/drawing/2010/main" val="0"/>
@@ -19280,7 +19582,7 @@
           </p:nvPr>
         </p:nvPicPr>
         <p:blipFill>
-          <a:blip r:embed="rId18">
+          <a:blip r:embed="rId18" cstate="hqprint">
             <a:extLst>
               <a:ext uri="{28A0092B-C50C-407E-A947-70E740481C1C}">
                 <a14:useLocalDpi xmlns:a14="http://schemas.microsoft.com/office/drawing/2010/main" val="0"/>
@@ -19301,8 +19603,8 @@
           </a:prstGeom>
         </p:spPr>
       </p:pic>
-      <mc:AlternateContent xmlns:mc="http://schemas.openxmlformats.org/markup-compatibility/2006">
-        <mc:Choice xmlns:a14="http://schemas.microsoft.com/office/drawing/2010/main" Requires="a14">
+      <mc:AlternateContent xmlns:mc="http://schemas.openxmlformats.org/markup-compatibility/2006" xmlns:a14="http://schemas.microsoft.com/office/drawing/2010/main">
+        <mc:Choice Requires="a14">
           <p:graphicFrame>
             <p:nvGraphicFramePr>
               <p:cNvPr id="70" name="表格 69">
@@ -19411,6 +19713,7 @@
                         <a:bodyPr/>
                         <a:lstStyle/>
                         <a:p>
+                          <a:pPr/>
                           <a14:m>
                             <m:oMathPara xmlns:m="http://schemas.openxmlformats.org/officeDocument/2006/math">
                               <m:oMathParaPr>
@@ -19527,7 +19830,7 @@
             </a:graphic>
           </p:graphicFrame>
         </mc:Choice>
-        <mc:Fallback>
+        <mc:Fallback xmlns="">
           <p:graphicFrame>
             <p:nvGraphicFramePr>
               <p:cNvPr id="70" name="表格 69">
@@ -19696,8 +19999,8 @@
           </p:graphicFrame>
         </mc:Fallback>
       </mc:AlternateContent>
-      <mc:AlternateContent xmlns:mc="http://schemas.openxmlformats.org/markup-compatibility/2006">
-        <mc:Choice xmlns:a14="http://schemas.microsoft.com/office/drawing/2010/main" Requires="a14">
+      <mc:AlternateContent xmlns:mc="http://schemas.openxmlformats.org/markup-compatibility/2006" xmlns:a14="http://schemas.microsoft.com/office/drawing/2010/main">
+        <mc:Choice Requires="a14">
           <p:graphicFrame>
             <p:nvGraphicFramePr>
               <p:cNvPr id="75" name="表格 74">
@@ -19806,6 +20109,7 @@
                         <a:bodyPr/>
                         <a:lstStyle/>
                         <a:p>
+                          <a:pPr/>
                           <a14:m>
                             <m:oMathPara xmlns:m="http://schemas.openxmlformats.org/officeDocument/2006/math">
                               <m:oMathParaPr>
@@ -19920,7 +20224,7 @@
             </a:graphic>
           </p:graphicFrame>
         </mc:Choice>
-        <mc:Fallback>
+        <mc:Fallback xmlns="">
           <p:graphicFrame>
             <p:nvGraphicFramePr>
               <p:cNvPr id="75" name="表格 74">
@@ -20081,8 +20385,8 @@
           </p:graphicFrame>
         </mc:Fallback>
       </mc:AlternateContent>
-      <mc:AlternateContent xmlns:mc="http://schemas.openxmlformats.org/markup-compatibility/2006">
-        <mc:Choice xmlns:a14="http://schemas.microsoft.com/office/drawing/2010/main" Requires="a14">
+      <mc:AlternateContent xmlns:mc="http://schemas.openxmlformats.org/markup-compatibility/2006" xmlns:a14="http://schemas.microsoft.com/office/drawing/2010/main">
+        <mc:Choice Requires="a14">
           <p:graphicFrame>
             <p:nvGraphicFramePr>
               <p:cNvPr id="76" name="表格 75">
@@ -20191,6 +20495,7 @@
                         <a:bodyPr/>
                         <a:lstStyle/>
                         <a:p>
+                          <a:pPr/>
                           <a14:m>
                             <m:oMathPara xmlns:m="http://schemas.openxmlformats.org/officeDocument/2006/math">
                               <m:oMathParaPr>
@@ -20307,7 +20612,7 @@
             </a:graphic>
           </p:graphicFrame>
         </mc:Choice>
-        <mc:Fallback>
+        <mc:Fallback xmlns="">
           <p:graphicFrame>
             <p:nvGraphicFramePr>
               <p:cNvPr id="76" name="表格 75">
@@ -20476,8 +20781,8 @@
           </p:graphicFrame>
         </mc:Fallback>
       </mc:AlternateContent>
-      <mc:AlternateContent xmlns:mc="http://schemas.openxmlformats.org/markup-compatibility/2006">
-        <mc:Choice xmlns:a14="http://schemas.microsoft.com/office/drawing/2010/main" Requires="a14">
+      <mc:AlternateContent xmlns:mc="http://schemas.openxmlformats.org/markup-compatibility/2006" xmlns:a14="http://schemas.microsoft.com/office/drawing/2010/main">
+        <mc:Choice Requires="a14">
           <p:graphicFrame>
             <p:nvGraphicFramePr>
               <p:cNvPr id="77" name="表格 76">
@@ -20586,6 +20891,7 @@
                         <a:bodyPr/>
                         <a:lstStyle/>
                         <a:p>
+                          <a:pPr/>
                           <a14:m>
                             <m:oMathPara xmlns:m="http://schemas.openxmlformats.org/officeDocument/2006/math">
                               <m:oMathParaPr>
@@ -20694,7 +21000,7 @@
             </a:graphic>
           </p:graphicFrame>
         </mc:Choice>
-        <mc:Fallback>
+        <mc:Fallback xmlns="">
           <p:graphicFrame>
             <p:nvGraphicFramePr>
               <p:cNvPr id="77" name="表格 76">
@@ -21164,8 +21470,8 @@
           </a:p>
         </p:txBody>
       </p:sp>
-      <mc:AlternateContent xmlns:mc="http://schemas.openxmlformats.org/markup-compatibility/2006">
-        <mc:Choice xmlns:a14="http://schemas.microsoft.com/office/drawing/2010/main" Requires="a14">
+      <mc:AlternateContent xmlns:mc="http://schemas.openxmlformats.org/markup-compatibility/2006" xmlns:a14="http://schemas.microsoft.com/office/drawing/2010/main">
+        <mc:Choice Requires="a14">
           <p:graphicFrame>
             <p:nvGraphicFramePr>
               <p:cNvPr id="79" name="表格 78">
@@ -21274,6 +21580,7 @@
                         <a:bodyPr/>
                         <a:lstStyle/>
                         <a:p>
+                          <a:pPr/>
                           <a14:m>
                             <m:oMathPara xmlns:m="http://schemas.openxmlformats.org/officeDocument/2006/math">
                               <m:oMathParaPr>
@@ -21382,7 +21689,7 @@
             </a:graphic>
           </p:graphicFrame>
         </mc:Choice>
-        <mc:Fallback>
+        <mc:Fallback xmlns="">
           <p:graphicFrame>
             <p:nvGraphicFramePr>
               <p:cNvPr id="79" name="表格 78">
@@ -21543,8 +21850,8 @@
           </p:graphicFrame>
         </mc:Fallback>
       </mc:AlternateContent>
-      <mc:AlternateContent xmlns:mc="http://schemas.openxmlformats.org/markup-compatibility/2006">
-        <mc:Choice xmlns:a14="http://schemas.microsoft.com/office/drawing/2010/main" Requires="a14">
+      <mc:AlternateContent xmlns:mc="http://schemas.openxmlformats.org/markup-compatibility/2006" xmlns:a14="http://schemas.microsoft.com/office/drawing/2010/main">
+        <mc:Choice Requires="a14">
           <p:graphicFrame>
             <p:nvGraphicFramePr>
               <p:cNvPr id="81" name="表格 80">
@@ -21653,6 +21960,7 @@
                         <a:bodyPr/>
                         <a:lstStyle/>
                         <a:p>
+                          <a:pPr/>
                           <a14:m>
                             <m:oMathPara xmlns:m="http://schemas.openxmlformats.org/officeDocument/2006/math">
                               <m:oMathParaPr>
@@ -21761,7 +22069,7 @@
             </a:graphic>
           </p:graphicFrame>
         </mc:Choice>
-        <mc:Fallback>
+        <mc:Fallback xmlns="">
           <p:graphicFrame>
             <p:nvGraphicFramePr>
               <p:cNvPr id="81" name="表格 80">
@@ -21922,8 +22230,8 @@
           </p:graphicFrame>
         </mc:Fallback>
       </mc:AlternateContent>
-      <mc:AlternateContent xmlns:mc="http://schemas.openxmlformats.org/markup-compatibility/2006">
-        <mc:Choice xmlns:a14="http://schemas.microsoft.com/office/drawing/2010/main" Requires="a14">
+      <mc:AlternateContent xmlns:mc="http://schemas.openxmlformats.org/markup-compatibility/2006" xmlns:a14="http://schemas.microsoft.com/office/drawing/2010/main">
+        <mc:Choice Requires="a14">
           <p:graphicFrame>
             <p:nvGraphicFramePr>
               <p:cNvPr id="82" name="表格 81">
@@ -22032,6 +22340,7 @@
                         <a:bodyPr/>
                         <a:lstStyle/>
                         <a:p>
+                          <a:pPr/>
                           <a14:m>
                             <m:oMathPara xmlns:m="http://schemas.openxmlformats.org/officeDocument/2006/math">
                               <m:oMathParaPr>
@@ -22148,7 +22457,7 @@
             </a:graphic>
           </p:graphicFrame>
         </mc:Choice>
-        <mc:Fallback>
+        <mc:Fallback xmlns="">
           <p:graphicFrame>
             <p:nvGraphicFramePr>
               <p:cNvPr id="82" name="表格 81">
@@ -22317,8 +22626,8 @@
           </p:graphicFrame>
         </mc:Fallback>
       </mc:AlternateContent>
-      <mc:AlternateContent xmlns:mc="http://schemas.openxmlformats.org/markup-compatibility/2006">
-        <mc:Choice xmlns:a14="http://schemas.microsoft.com/office/drawing/2010/main" Requires="a14">
+      <mc:AlternateContent xmlns:mc="http://schemas.openxmlformats.org/markup-compatibility/2006" xmlns:a14="http://schemas.microsoft.com/office/drawing/2010/main">
+        <mc:Choice Requires="a14">
           <p:graphicFrame>
             <p:nvGraphicFramePr>
               <p:cNvPr id="83" name="表格 82">
@@ -22427,6 +22736,7 @@
                         <a:bodyPr/>
                         <a:lstStyle/>
                         <a:p>
+                          <a:pPr/>
                           <a14:m>
                             <m:oMathPara xmlns:m="http://schemas.openxmlformats.org/officeDocument/2006/math">
                               <m:oMathParaPr>
@@ -22535,7 +22845,7 @@
             </a:graphic>
           </p:graphicFrame>
         </mc:Choice>
-        <mc:Fallback>
+        <mc:Fallback xmlns="">
           <p:graphicFrame>
             <p:nvGraphicFramePr>
               <p:cNvPr id="83" name="表格 82">
@@ -22711,13 +23021,13 @@
           <p:nvPr/>
         </p:nvPicPr>
         <p:blipFill>
-          <a:blip r:embed="rId11">
+          <a:blip r:embed="rId11" cstate="hqprint">
             <a:extLst>
               <a:ext uri="{28A0092B-C50C-407E-A947-70E740481C1C}">
                 <a14:useLocalDpi xmlns:a14="http://schemas.microsoft.com/office/drawing/2010/main" val="0"/>
               </a:ext>
               <a:ext uri="{96DAC541-7B7A-43D3-8B79-37D633B846F1}">
-                <asvg:svgBlip xmlns:asvg="http://schemas.microsoft.com/office/drawing/2016/SVG/main" r:embed="rId12"/>
+                <asvg:svgBlip xmlns:asvg="http://schemas.microsoft.com/office/drawing/2016/SVG/main" xmlns="" r:embed="rId12"/>
               </a:ext>
             </a:extLst>
           </a:blip>
@@ -22750,13 +23060,13 @@
           <p:nvPr/>
         </p:nvPicPr>
         <p:blipFill>
-          <a:blip r:embed="rId14">
+          <a:blip r:embed="rId14" cstate="hqprint">
             <a:extLst>
               <a:ext uri="{28A0092B-C50C-407E-A947-70E740481C1C}">
                 <a14:useLocalDpi xmlns:a14="http://schemas.microsoft.com/office/drawing/2010/main" val="0"/>
               </a:ext>
               <a:ext uri="{96DAC541-7B7A-43D3-8B79-37D633B846F1}">
-                <asvg:svgBlip xmlns:asvg="http://schemas.microsoft.com/office/drawing/2016/SVG/main" r:embed="rId15"/>
+                <asvg:svgBlip xmlns:asvg="http://schemas.microsoft.com/office/drawing/2016/SVG/main" xmlns="" r:embed="rId15"/>
               </a:ext>
             </a:extLst>
           </a:blip>
@@ -22789,13 +23099,13 @@
           <p:nvPr/>
         </p:nvPicPr>
         <p:blipFill>
-          <a:blip r:embed="rId14">
+          <a:blip r:embed="rId14" cstate="hqprint">
             <a:extLst>
               <a:ext uri="{28A0092B-C50C-407E-A947-70E740481C1C}">
                 <a14:useLocalDpi xmlns:a14="http://schemas.microsoft.com/office/drawing/2010/main" val="0"/>
               </a:ext>
               <a:ext uri="{96DAC541-7B7A-43D3-8B79-37D633B846F1}">
-                <asvg:svgBlip xmlns:asvg="http://schemas.microsoft.com/office/drawing/2016/SVG/main" r:embed="rId15"/>
+                <asvg:svgBlip xmlns:asvg="http://schemas.microsoft.com/office/drawing/2016/SVG/main" xmlns="" r:embed="rId15"/>
               </a:ext>
             </a:extLst>
           </a:blip>
@@ -22828,13 +23138,13 @@
           <p:nvPr/>
         </p:nvPicPr>
         <p:blipFill>
-          <a:blip r:embed="rId14">
+          <a:blip r:embed="rId14" cstate="hqprint">
             <a:extLst>
               <a:ext uri="{28A0092B-C50C-407E-A947-70E740481C1C}">
                 <a14:useLocalDpi xmlns:a14="http://schemas.microsoft.com/office/drawing/2010/main" val="0"/>
               </a:ext>
               <a:ext uri="{96DAC541-7B7A-43D3-8B79-37D633B846F1}">
-                <asvg:svgBlip xmlns:asvg="http://schemas.microsoft.com/office/drawing/2016/SVG/main" r:embed="rId15"/>
+                <asvg:svgBlip xmlns:asvg="http://schemas.microsoft.com/office/drawing/2016/SVG/main" xmlns="" r:embed="rId15"/>
               </a:ext>
             </a:extLst>
           </a:blip>
@@ -22867,13 +23177,13 @@
           <p:nvPr/>
         </p:nvPicPr>
         <p:blipFill>
-          <a:blip r:embed="rId14">
+          <a:blip r:embed="rId14" cstate="hqprint">
             <a:extLst>
               <a:ext uri="{28A0092B-C50C-407E-A947-70E740481C1C}">
                 <a14:useLocalDpi xmlns:a14="http://schemas.microsoft.com/office/drawing/2010/main" val="0"/>
               </a:ext>
               <a:ext uri="{96DAC541-7B7A-43D3-8B79-37D633B846F1}">
-                <asvg:svgBlip xmlns:asvg="http://schemas.microsoft.com/office/drawing/2016/SVG/main" r:embed="rId15"/>
+                <asvg:svgBlip xmlns:asvg="http://schemas.microsoft.com/office/drawing/2016/SVG/main" xmlns="" r:embed="rId15"/>
               </a:ext>
             </a:extLst>
           </a:blip>
@@ -22946,7 +23256,7 @@
           </p:nvPr>
         </p:nvPicPr>
         <p:blipFill>
-          <a:blip r:embed="rId16">
+          <a:blip r:embed="rId16" cstate="hqprint">
             <a:extLst>
               <a:ext uri="{28A0092B-C50C-407E-A947-70E740481C1C}">
                 <a14:useLocalDpi xmlns:a14="http://schemas.microsoft.com/office/drawing/2010/main" val="0"/>
@@ -23195,7 +23505,7 @@
           </p:nvPr>
         </p:nvPicPr>
         <p:blipFill>
-          <a:blip r:embed="rId27">
+          <a:blip r:embed="rId27" cstate="hqprint">
             <a:extLst>
               <a:ext uri="{28A0092B-C50C-407E-A947-70E740481C1C}">
                 <a14:useLocalDpi xmlns:a14="http://schemas.microsoft.com/office/drawing/2010/main" val="0"/>
@@ -23296,7 +23606,7 @@
           </p:nvPr>
         </p:nvPicPr>
         <p:blipFill>
-          <a:blip r:embed="rId28">
+          <a:blip r:embed="rId28" cstate="hqprint">
             <a:extLst>
               <a:ext uri="{28A0092B-C50C-407E-A947-70E740481C1C}">
                 <a14:useLocalDpi xmlns:a14="http://schemas.microsoft.com/office/drawing/2010/main" val="0"/>
@@ -23384,7 +23694,7 @@
           </p:nvPr>
         </p:nvPicPr>
         <p:blipFill>
-          <a:blip r:embed="rId29">
+          <a:blip r:embed="rId29" cstate="hqprint">
             <a:extLst>
               <a:ext uri="{28A0092B-C50C-407E-A947-70E740481C1C}">
                 <a14:useLocalDpi xmlns:a14="http://schemas.microsoft.com/office/drawing/2010/main" val="0"/>
@@ -23611,7 +23921,7 @@
           </p:nvPr>
         </p:nvPicPr>
         <p:blipFill>
-          <a:blip r:embed="rId30">
+          <a:blip r:embed="rId30" cstate="hqprint">
             <a:extLst>
               <a:ext uri="{28A0092B-C50C-407E-A947-70E740481C1C}">
                 <a14:useLocalDpi xmlns:a14="http://schemas.microsoft.com/office/drawing/2010/main" val="0"/>
@@ -25360,7 +25670,7 @@
           </p:nvPr>
         </p:nvPicPr>
         <p:blipFill>
-          <a:blip r:embed="rId4">
+          <a:blip r:embed="rId4" cstate="hqprint">
             <a:extLst>
               <a:ext uri="{28A0092B-C50C-407E-A947-70E740481C1C}">
                 <a14:useLocalDpi xmlns:a14="http://schemas.microsoft.com/office/drawing/2010/main" val="0"/>
@@ -25466,7 +25776,7 @@
           </p:nvPr>
         </p:nvPicPr>
         <p:blipFill>
-          <a:blip r:embed="rId7">
+          <a:blip r:embed="rId7" cstate="hqprint">
             <a:extLst>
               <a:ext uri="{28A0092B-C50C-407E-A947-70E740481C1C}">
                 <a14:useLocalDpi xmlns:a14="http://schemas.microsoft.com/office/drawing/2010/main" val="0"/>
@@ -25675,6 +25985,29 @@
           <a:chExt cx="0" cy="0"/>
         </a:xfrm>
       </p:grpSpPr>
+      <p:pic>
+        <p:nvPicPr>
+          <p:cNvPr id="7" name="圖片 6"/>
+          <p:cNvPicPr>
+            <a:picLocks noChangeAspect="1"/>
+          </p:cNvPicPr>
+          <p:nvPr/>
+        </p:nvPicPr>
+        <p:blipFill rotWithShape="1">
+          <a:blip r:embed="rId3"/>
+          <a:srcRect l="736" t="4954" r="5738" b="34"/>
+          <a:stretch/>
+        </p:blipFill>
+        <p:spPr>
+          <a:xfrm>
+            <a:off x="8475848" y="2981640"/>
+            <a:ext cx="538944" cy="278396"/>
+          </a:xfrm>
+          <a:prstGeom prst="rect">
+            <a:avLst/>
+          </a:prstGeom>
+        </p:spPr>
+      </p:pic>
       <p:sp>
         <p:nvSpPr>
           <p:cNvPr id="2" name="標題 1">
@@ -25711,43 +26044,167 @@
           </a:p>
         </p:txBody>
       </p:sp>
-      <p:sp>
-        <p:nvSpPr>
-          <p:cNvPr id="3" name="內容版面配置區 2">
-            <a:extLst>
-              <a:ext uri="{FF2B5EF4-FFF2-40B4-BE49-F238E27FC236}">
-                <a16:creationId xmlns:a16="http://schemas.microsoft.com/office/drawing/2014/main" id="{6180C39A-F52D-4B70-8799-BA66C283172D}"/>
-              </a:ext>
-            </a:extLst>
-          </p:cNvPr>
-          <p:cNvSpPr>
-            <a:spLocks noGrp="1"/>
-          </p:cNvSpPr>
-          <p:nvPr>
-            <p:ph idx="1"/>
-          </p:nvPr>
-        </p:nvSpPr>
-        <p:spPr/>
-        <p:txBody>
-          <a:bodyPr/>
-          <a:lstStyle/>
-          <a:p>
-            <a:r>
-              <a:rPr lang="en-US" altLang="zh-TW" dirty="0"/>
-              <a:t>Assume the detection is coherent, and the modulation is QPSK.</a:t>
-            </a:r>
-          </a:p>
-          <a:p>
-            <a:r>
-              <a:rPr lang="en-US" altLang="zh-TW" dirty="0"/>
-              <a:t>The bit error rate should be</a:t>
-            </a:r>
-          </a:p>
-          <a:p>
-            <a:endParaRPr lang="zh-TW" altLang="en-US" dirty="0"/>
-          </a:p>
-        </p:txBody>
-      </p:sp>
+      <mc:AlternateContent xmlns:mc="http://schemas.openxmlformats.org/markup-compatibility/2006">
+        <mc:Choice xmlns:a14="http://schemas.microsoft.com/office/drawing/2010/main" Requires="a14">
+          <p:sp>
+            <p:nvSpPr>
+              <p:cNvPr id="3" name="內容版面配置區 2">
+                <a:extLst>
+                  <a:ext uri="{FF2B5EF4-FFF2-40B4-BE49-F238E27FC236}">
+                    <a16:creationId xmlns:a16="http://schemas.microsoft.com/office/drawing/2014/main" id="{6180C39A-F52D-4B70-8799-BA66C283172D}"/>
+                  </a:ext>
+                </a:extLst>
+              </p:cNvPr>
+              <p:cNvSpPr>
+                <a:spLocks noGrp="1"/>
+              </p:cNvSpPr>
+              <p:nvPr>
+                <p:ph idx="1"/>
+              </p:nvPr>
+            </p:nvSpPr>
+            <p:spPr/>
+            <p:txBody>
+              <a:bodyPr/>
+              <a:lstStyle/>
+              <a:p>
+                <a:r>
+                  <a:rPr lang="en-US" altLang="zh-TW" dirty="0" smtClean="0"/>
+                  <a:t>Assume the detection is coherent, and the modulation is QPSK.</a:t>
+                </a:r>
+              </a:p>
+              <a:p>
+                <a:r>
+                  <a:rPr lang="en-US" altLang="zh-TW" dirty="0"/>
+                  <a:t>The bit error rate should </a:t>
+                </a:r>
+                <a:r>
+                  <a:rPr lang="en-US" altLang="zh-TW" dirty="0" smtClean="0"/>
+                  <a:t>be</a:t>
+                </a:r>
+              </a:p>
+              <a:p>
+                <a:r>
+                  <a:rPr lang="en-US" altLang="zh-TW" dirty="0" smtClean="0"/>
+                  <a:t>Assume the data is encoded with an </a:t>
+                </a:r>
+                <a14:m>
+                  <m:oMath xmlns:m="http://schemas.openxmlformats.org/officeDocument/2006/math">
+                    <m:d>
+                      <m:dPr>
+                        <m:ctrlPr>
+                          <a:rPr lang="en-US" altLang="zh-TW" i="1" smtClean="0">
+                            <a:latin typeface="Cambria Math" panose="02040503050406030204" pitchFamily="18" charset="0"/>
+                          </a:rPr>
+                        </m:ctrlPr>
+                      </m:dPr>
+                      <m:e>
+                        <m:r>
+                          <a:rPr lang="en-US" altLang="zh-TW" b="0" i="1" smtClean="0">
+                            <a:latin typeface="Cambria Math" panose="02040503050406030204" pitchFamily="18" charset="0"/>
+                          </a:rPr>
+                          <m:t>𝑛</m:t>
+                        </m:r>
+                        <m:r>
+                          <a:rPr lang="en-US" altLang="zh-TW" b="0" i="1" smtClean="0">
+                            <a:latin typeface="Cambria Math" panose="02040503050406030204" pitchFamily="18" charset="0"/>
+                          </a:rPr>
+                          <m:t>,</m:t>
+                        </m:r>
+                        <m:r>
+                          <a:rPr lang="en-US" altLang="zh-TW" b="0" i="1" smtClean="0">
+                            <a:latin typeface="Cambria Math" panose="02040503050406030204" pitchFamily="18" charset="0"/>
+                          </a:rPr>
+                          <m:t>𝑘</m:t>
+                        </m:r>
+                      </m:e>
+                    </m:d>
+                  </m:oMath>
+                </a14:m>
+                <a:r>
+                  <a:rPr lang="en-US" altLang="zh-TW" dirty="0" smtClean="0"/>
+                  <a:t> code with minimum distance </a:t>
+                </a:r>
+                <a:endParaRPr lang="en-US" altLang="zh-TW" dirty="0"/>
+              </a:p>
+              <a:p>
+                <a:pPr lvl="1"/>
+                <a:r>
+                  <a:rPr lang="en-US" altLang="zh-TW" dirty="0" smtClean="0"/>
+                  <a:t>We consider the diversity to be </a:t>
+                </a:r>
+              </a:p>
+              <a:p>
+                <a:r>
+                  <a:rPr lang="en-US" altLang="zh-TW" dirty="0" smtClean="0"/>
+                  <a:t>Therefore, the pairwise error probability should be as follows:</a:t>
+                </a:r>
+              </a:p>
+              <a:p>
+                <a:endParaRPr lang="en-US" altLang="zh-TW" dirty="0"/>
+              </a:p>
+              <a:p>
+                <a:endParaRPr lang="en-US" altLang="zh-TW" dirty="0" smtClean="0"/>
+              </a:p>
+              <a:p>
+                <a:endParaRPr lang="en-US" altLang="zh-TW" dirty="0"/>
+              </a:p>
+              <a:p>
+                <a:r>
+                  <a:rPr lang="en-US" altLang="zh-TW" dirty="0" smtClean="0"/>
+                  <a:t>We can thus derive the union bound for </a:t>
+                </a:r>
+                <a:r>
+                  <a:rPr lang="en-US" altLang="zh-TW" dirty="0" err="1" smtClean="0"/>
+                  <a:t>codeword</a:t>
+                </a:r>
+                <a:r>
+                  <a:rPr lang="en-US" altLang="zh-TW" dirty="0" smtClean="0"/>
+                  <a:t> error rate:</a:t>
+                </a:r>
+              </a:p>
+            </p:txBody>
+          </p:sp>
+        </mc:Choice>
+        <mc:Fallback>
+          <p:sp>
+            <p:nvSpPr>
+              <p:cNvPr id="3" name="內容版面配置區 2">
+                <a:extLst>
+                  <a:ext uri="{FF2B5EF4-FFF2-40B4-BE49-F238E27FC236}">
+                    <a16:creationId xmlns:a16="http://schemas.microsoft.com/office/drawing/2014/main" id="{6180C39A-F52D-4B70-8799-BA66C283172D}"/>
+                  </a:ext>
+                </a:extLst>
+              </p:cNvPr>
+              <p:cNvSpPr>
+                <a:spLocks noGrp="1" noRot="1" noChangeAspect="1" noMove="1" noResize="1" noEditPoints="1" noAdjustHandles="1" noChangeArrowheads="1" noChangeShapeType="1" noTextEdit="1"/>
+              </p:cNvSpPr>
+              <p:nvPr>
+                <p:ph idx="1"/>
+              </p:nvPr>
+            </p:nvSpPr>
+            <p:spPr>
+              <a:blipFill>
+                <a:blip r:embed="rId4"/>
+                <a:stretch>
+                  <a:fillRect l="-142" t="-942"/>
+                </a:stretch>
+              </a:blipFill>
+            </p:spPr>
+            <p:txBody>
+              <a:bodyPr/>
+              <a:lstStyle/>
+              <a:p>
+                <a:r>
+                  <a:rPr lang="zh-TW" altLang="en-US">
+                    <a:noFill/>
+                  </a:rPr>
+                  <a:t> </a:t>
+                </a:r>
+              </a:p>
+            </p:txBody>
+          </p:sp>
+        </mc:Fallback>
+      </mc:AlternateContent>
       <p:pic>
         <p:nvPicPr>
           <p:cNvPr id="4" name="圖片 3">
@@ -25763,14 +26220,14 @@
           <p:nvPr/>
         </p:nvPicPr>
         <p:blipFill>
-          <a:blip r:embed="rId3"/>
+          <a:blip r:embed="rId5"/>
           <a:stretch>
             <a:fillRect/>
           </a:stretch>
         </p:blipFill>
         <p:spPr>
           <a:xfrm>
-            <a:off x="8755082" y="3497924"/>
+            <a:off x="8755082" y="3474427"/>
             <a:ext cx="3436918" cy="3383573"/>
           </a:xfrm>
           <a:prstGeom prst="rect">
@@ -25797,7 +26254,7 @@
           </p:nvPr>
         </p:nvPicPr>
         <p:blipFill>
-          <a:blip r:embed="rId4">
+          <a:blip r:embed="rId6" cstate="hqprint">
             <a:extLst>
               <a:ext uri="{28A0092B-C50C-407E-A947-70E740481C1C}">
                 <a14:useLocalDpi xmlns:a14="http://schemas.microsoft.com/office/drawing/2010/main" val="0"/>
@@ -25810,8 +26267,103 @@
         </p:blipFill>
         <p:spPr>
           <a:xfrm>
-            <a:off x="4165630" y="2549330"/>
+            <a:off x="7184423" y="2405980"/>
             <a:ext cx="1855725" cy="616365"/>
+          </a:xfrm>
+          <a:prstGeom prst="rect">
+            <a:avLst/>
+          </a:prstGeom>
+        </p:spPr>
+      </p:pic>
+      <p:pic>
+        <p:nvPicPr>
+          <p:cNvPr id="5" name="圖片 4"/>
+          <p:cNvPicPr>
+            <a:picLocks noChangeAspect="1"/>
+          </p:cNvPicPr>
+          <p:nvPr/>
+        </p:nvPicPr>
+        <p:blipFill rotWithShape="1">
+          <a:blip r:embed="rId7"/>
+          <a:srcRect t="3346" b="-1"/>
+          <a:stretch/>
+        </p:blipFill>
+        <p:spPr>
+          <a:xfrm>
+            <a:off x="4171072" y="2554357"/>
+            <a:ext cx="2779498" cy="327202"/>
+          </a:xfrm>
+          <a:prstGeom prst="rect">
+            <a:avLst/>
+          </a:prstGeom>
+        </p:spPr>
+      </p:pic>
+      <p:pic>
+        <p:nvPicPr>
+          <p:cNvPr id="9" name="圖片 8"/>
+          <p:cNvPicPr>
+            <a:picLocks noChangeAspect="1"/>
+          </p:cNvPicPr>
+          <p:nvPr/>
+        </p:nvPicPr>
+        <p:blipFill>
+          <a:blip r:embed="rId8"/>
+          <a:stretch>
+            <a:fillRect/>
+          </a:stretch>
+        </p:blipFill>
+        <p:spPr>
+          <a:xfrm>
+            <a:off x="4403178" y="3388170"/>
+            <a:ext cx="1144979" cy="303977"/>
+          </a:xfrm>
+          <a:prstGeom prst="rect">
+            <a:avLst/>
+          </a:prstGeom>
+        </p:spPr>
+      </p:pic>
+      <p:pic>
+        <p:nvPicPr>
+          <p:cNvPr id="11" name="圖片 10"/>
+          <p:cNvPicPr>
+            <a:picLocks noChangeAspect="1"/>
+          </p:cNvPicPr>
+          <p:nvPr/>
+        </p:nvPicPr>
+        <p:blipFill>
+          <a:blip r:embed="rId9"/>
+          <a:stretch>
+            <a:fillRect/>
+          </a:stretch>
+        </p:blipFill>
+        <p:spPr>
+          <a:xfrm>
+            <a:off x="1206930" y="4198758"/>
+            <a:ext cx="7537473" cy="982481"/>
+          </a:xfrm>
+          <a:prstGeom prst="rect">
+            <a:avLst/>
+          </a:prstGeom>
+        </p:spPr>
+      </p:pic>
+      <p:pic>
+        <p:nvPicPr>
+          <p:cNvPr id="12" name="圖片 11"/>
+          <p:cNvPicPr>
+            <a:picLocks noChangeAspect="1"/>
+          </p:cNvPicPr>
+          <p:nvPr/>
+        </p:nvPicPr>
+        <p:blipFill>
+          <a:blip r:embed="rId10"/>
+          <a:stretch>
+            <a:fillRect/>
+          </a:stretch>
+        </p:blipFill>
+        <p:spPr>
+          <a:xfrm>
+            <a:off x="1206930" y="5693670"/>
+            <a:ext cx="5889609" cy="933719"/>
           </a:xfrm>
           <a:prstGeom prst="rect">
             <a:avLst/>

</xml_diff>